<commit_message>
Switch license from BY-NC to BY-SA
</commit_message>
<xml_diff>
--- a/units/1/lessons/2/resources/petascale-lesson-1.2-slides.pptx
+++ b/units/1/lessons/2/resources/petascale-lesson-1.2-slides.pptx
@@ -10,7 +10,7 @@
   </p:notesMasterIdLst>
   <p:sldIdLst>
     <p:sldId id="331" r:id="rId3"/>
-    <p:sldId id="332" r:id="rId4"/>
+    <p:sldId id="333" r:id="rId4"/>
     <p:sldId id="256" r:id="rId5"/>
     <p:sldId id="257" r:id="rId6"/>
     <p:sldId id="266" r:id="rId7"/>
@@ -219,7 +219,7 @@
           <a:p>
             <a:fld id="{C40B3AFE-7C7C-4FC9-A8B9-F4DBDC42F3ED}" type="datetimeFigureOut">
               <a:rPr lang="en-US" smtClean="0"/>
-              <a:t>9/12/20</a:t>
+              <a:t>10/11/20</a:t>
             </a:fld>
             <a:endParaRPr lang="en-US"/>
           </a:p>
@@ -786,7 +786,7 @@
           <a:p>
             <a:fld id="{9ECC21AE-C854-42EF-90E6-1016E4386352}" type="datetimeFigureOut">
               <a:rPr lang="en-US" smtClean="0"/>
-              <a:t>9/12/20</a:t>
+              <a:t>10/11/20</a:t>
             </a:fld>
             <a:endParaRPr lang="en-US" dirty="0"/>
           </a:p>
@@ -1060,7 +1060,7 @@
           <a:p>
             <a:fld id="{9ECC21AE-C854-42EF-90E6-1016E4386352}" type="datetimeFigureOut">
               <a:rPr lang="en-US" smtClean="0"/>
-              <a:t>9/12/20</a:t>
+              <a:t>10/11/20</a:t>
             </a:fld>
             <a:endParaRPr lang="en-US" dirty="0"/>
           </a:p>
@@ -1254,7 +1254,7 @@
           <a:p>
             <a:fld id="{9ECC21AE-C854-42EF-90E6-1016E4386352}" type="datetimeFigureOut">
               <a:rPr lang="en-US" smtClean="0"/>
-              <a:t>9/12/20</a:t>
+              <a:t>10/11/20</a:t>
             </a:fld>
             <a:endParaRPr lang="en-US" dirty="0"/>
           </a:p>
@@ -1522,7 +1522,7 @@
           <a:p>
             <a:fld id="{9ECC21AE-C854-42EF-90E6-1016E4386352}" type="datetimeFigureOut">
               <a:rPr lang="en-US" smtClean="0"/>
-              <a:t>9/12/20</a:t>
+              <a:t>10/11/20</a:t>
             </a:fld>
             <a:endParaRPr lang="en-US" dirty="0"/>
           </a:p>
@@ -1854,7 +1854,7 @@
           <a:p>
             <a:fld id="{9ECC21AE-C854-42EF-90E6-1016E4386352}" type="datetimeFigureOut">
               <a:rPr lang="en-US" smtClean="0"/>
-              <a:t>9/12/20</a:t>
+              <a:t>10/11/20</a:t>
             </a:fld>
             <a:endParaRPr lang="en-US" dirty="0"/>
           </a:p>
@@ -2464,7 +2464,7 @@
           <a:p>
             <a:fld id="{9ECC21AE-C854-42EF-90E6-1016E4386352}" type="datetimeFigureOut">
               <a:rPr lang="en-US" smtClean="0"/>
-              <a:t>9/12/20</a:t>
+              <a:t>10/11/20</a:t>
             </a:fld>
             <a:endParaRPr lang="en-US" dirty="0"/>
           </a:p>
@@ -3308,7 +3308,7 @@
           <a:p>
             <a:fld id="{9ECC21AE-C854-42EF-90E6-1016E4386352}" type="datetimeFigureOut">
               <a:rPr lang="en-US" smtClean="0"/>
-              <a:t>9/12/20</a:t>
+              <a:t>10/11/20</a:t>
             </a:fld>
             <a:endParaRPr lang="en-US" dirty="0"/>
           </a:p>
@@ -3478,7 +3478,7 @@
           <a:p>
             <a:fld id="{9ECC21AE-C854-42EF-90E6-1016E4386352}" type="datetimeFigureOut">
               <a:rPr lang="en-US" smtClean="0"/>
-              <a:t>9/12/20</a:t>
+              <a:t>10/11/20</a:t>
             </a:fld>
             <a:endParaRPr lang="en-US" dirty="0"/>
           </a:p>
@@ -3658,7 +3658,7 @@
           <a:p>
             <a:fld id="{9ECC21AE-C854-42EF-90E6-1016E4386352}" type="datetimeFigureOut">
               <a:rPr lang="en-US" smtClean="0"/>
-              <a:t>9/12/20</a:t>
+              <a:t>10/11/20</a:t>
             </a:fld>
             <a:endParaRPr lang="en-US" dirty="0"/>
           </a:p>
@@ -3857,7 +3857,7 @@
                 </a:solidFill>
               </a:rPr>
               <a:pPr/>
-              <a:t>9/12/20</a:t>
+              <a:t>10/11/20</a:t>
             </a:fld>
             <a:endParaRPr lang="en-US">
               <a:solidFill>
@@ -4055,7 +4055,7 @@
                 </a:solidFill>
               </a:rPr>
               <a:pPr/>
-              <a:t>9/12/20</a:t>
+              <a:t>10/11/20</a:t>
             </a:fld>
             <a:endParaRPr lang="en-US">
               <a:solidFill>
@@ -4246,7 +4246,7 @@
           <a:p>
             <a:fld id="{9ECC21AE-C854-42EF-90E6-1016E4386352}" type="datetimeFigureOut">
               <a:rPr lang="en-US" smtClean="0"/>
-              <a:t>9/12/20</a:t>
+              <a:t>10/11/20</a:t>
             </a:fld>
             <a:endParaRPr lang="en-US" dirty="0"/>
           </a:p>
@@ -4499,7 +4499,7 @@
                 </a:solidFill>
               </a:rPr>
               <a:pPr/>
-              <a:t>9/12/20</a:t>
+              <a:t>10/11/20</a:t>
             </a:fld>
             <a:endParaRPr lang="en-US">
               <a:solidFill>
@@ -4759,7 +4759,7 @@
                 </a:solidFill>
               </a:rPr>
               <a:pPr/>
-              <a:t>9/12/20</a:t>
+              <a:t>10/11/20</a:t>
             </a:fld>
             <a:endParaRPr lang="en-US">
               <a:solidFill>
@@ -5154,7 +5154,7 @@
                 </a:solidFill>
               </a:rPr>
               <a:pPr/>
-              <a:t>9/12/20</a:t>
+              <a:t>10/11/20</a:t>
             </a:fld>
             <a:endParaRPr lang="en-US">
               <a:solidFill>
@@ -5300,7 +5300,7 @@
                 </a:solidFill>
               </a:rPr>
               <a:pPr/>
-              <a:t>9/12/20</a:t>
+              <a:t>10/11/20</a:t>
             </a:fld>
             <a:endParaRPr lang="en-US">
               <a:solidFill>
@@ -5423,7 +5423,7 @@
                 </a:solidFill>
               </a:rPr>
               <a:pPr/>
-              <a:t>9/12/20</a:t>
+              <a:t>10/11/20</a:t>
             </a:fld>
             <a:endParaRPr lang="en-US">
               <a:solidFill>
@@ -5728,7 +5728,7 @@
                 </a:solidFill>
               </a:rPr>
               <a:pPr/>
-              <a:t>9/12/20</a:t>
+              <a:t>10/11/20</a:t>
             </a:fld>
             <a:endParaRPr lang="en-US">
               <a:solidFill>
@@ -6009,7 +6009,7 @@
                 </a:solidFill>
               </a:rPr>
               <a:pPr/>
-              <a:t>9/12/20</a:t>
+              <a:t>10/11/20</a:t>
             </a:fld>
             <a:endParaRPr lang="en-US">
               <a:solidFill>
@@ -6207,7 +6207,7 @@
                 </a:solidFill>
               </a:rPr>
               <a:pPr/>
-              <a:t>9/12/20</a:t>
+              <a:t>10/11/20</a:t>
             </a:fld>
             <a:endParaRPr lang="en-US">
               <a:solidFill>
@@ -6415,7 +6415,7 @@
                 </a:solidFill>
               </a:rPr>
               <a:pPr/>
-              <a:t>9/12/20</a:t>
+              <a:t>10/11/20</a:t>
             </a:fld>
             <a:endParaRPr lang="en-US">
               <a:solidFill>
@@ -6680,7 +6680,7 @@
           <a:p>
             <a:fld id="{9ECC21AE-C854-42EF-90E6-1016E4386352}" type="datetimeFigureOut">
               <a:rPr lang="en-US" smtClean="0"/>
-              <a:t>9/12/20</a:t>
+              <a:t>10/11/20</a:t>
             </a:fld>
             <a:endParaRPr lang="en-US" dirty="0"/>
           </a:p>
@@ -6972,7 +6972,7 @@
           <a:p>
             <a:fld id="{9ECC21AE-C854-42EF-90E6-1016E4386352}" type="datetimeFigureOut">
               <a:rPr lang="en-US" smtClean="0"/>
-              <a:t>9/12/20</a:t>
+              <a:t>10/11/20</a:t>
             </a:fld>
             <a:endParaRPr lang="en-US" dirty="0"/>
           </a:p>
@@ -7410,7 +7410,7 @@
           <a:p>
             <a:fld id="{9ECC21AE-C854-42EF-90E6-1016E4386352}" type="datetimeFigureOut">
               <a:rPr lang="en-US" smtClean="0"/>
-              <a:t>9/12/20</a:t>
+              <a:t>10/11/20</a:t>
             </a:fld>
             <a:endParaRPr lang="en-US" dirty="0"/>
           </a:p>
@@ -7528,7 +7528,7 @@
           <a:p>
             <a:fld id="{9ECC21AE-C854-42EF-90E6-1016E4386352}" type="datetimeFigureOut">
               <a:rPr lang="en-US" smtClean="0"/>
-              <a:t>9/12/20</a:t>
+              <a:t>10/11/20</a:t>
             </a:fld>
             <a:endParaRPr lang="en-US" dirty="0"/>
           </a:p>
@@ -7623,7 +7623,7 @@
           <a:p>
             <a:fld id="{9ECC21AE-C854-42EF-90E6-1016E4386352}" type="datetimeFigureOut">
               <a:rPr lang="en-US" smtClean="0"/>
-              <a:t>9/12/20</a:t>
+              <a:t>10/11/20</a:t>
             </a:fld>
             <a:endParaRPr lang="en-US" dirty="0"/>
           </a:p>
@@ -7902,7 +7902,7 @@
           <a:p>
             <a:fld id="{9ECC21AE-C854-42EF-90E6-1016E4386352}" type="datetimeFigureOut">
               <a:rPr lang="en-US" smtClean="0"/>
-              <a:t>9/12/20</a:t>
+              <a:t>10/11/20</a:t>
             </a:fld>
             <a:endParaRPr lang="en-US" dirty="0"/>
           </a:p>
@@ -8176,7 +8176,7 @@
           <a:p>
             <a:fld id="{9ECC21AE-C854-42EF-90E6-1016E4386352}" type="datetimeFigureOut">
               <a:rPr lang="en-US" smtClean="0"/>
-              <a:t>9/12/20</a:t>
+              <a:t>10/11/20</a:t>
             </a:fld>
             <a:endParaRPr lang="en-US" dirty="0"/>
           </a:p>
@@ -8605,7 +8605,7 @@
           <a:p>
             <a:fld id="{9ECC21AE-C854-42EF-90E6-1016E4386352}" type="datetimeFigureOut">
               <a:rPr lang="en-US" smtClean="0"/>
-              <a:t>9/12/20</a:t>
+              <a:t>10/11/20</a:t>
             </a:fld>
             <a:endParaRPr lang="en-US" dirty="0"/>
           </a:p>
@@ -9249,7 +9249,7 @@
                 </a:solidFill>
               </a:rPr>
               <a:pPr defTabSz="914400"/>
-              <a:t>9/12/20</a:t>
+              <a:t>10/11/20</a:t>
             </a:fld>
             <a:endParaRPr lang="en-US">
               <a:solidFill>
@@ -9768,15 +9768,7 @@
                 <a:ea typeface="Times New Roman" charset="0"/>
                 <a:cs typeface="Times New Roman" charset="0"/>
               </a:rPr>
-              <a:t>Lesson </a:t>
-            </a:r>
-            <a:r>
-              <a:rPr lang="en-US" sz="3600" b="1" dirty="0" smtClean="0">
-                <a:latin typeface="Times New Roman" charset="0"/>
-                <a:ea typeface="Times New Roman" charset="0"/>
-                <a:cs typeface="Times New Roman" charset="0"/>
-              </a:rPr>
-              <a:t>2</a:t>
+              <a:t>Lesson 2</a:t>
             </a:r>
             <a:r>
               <a:rPr lang="en-US" sz="3600" b="1" dirty="0">
@@ -9899,10 +9891,10 @@
           <p:cNvPr id="8" name="Rectangle 7">
             <a:extLst>
               <a:ext uri="{FF2B5EF4-FFF2-40B4-BE49-F238E27FC236}">
-                <a16:creationId xmlns="" xmlns:a16="http://schemas.microsoft.com/office/drawing/2014/main" id="{74CD14DB-BB81-479F-A1FC-1C75640E9F84}"/>
+                <a16:creationId xmlns:a16="http://schemas.microsoft.com/office/drawing/2014/main" xmlns="" id="{74CD14DB-BB81-479F-A1FC-1C75640E9F84}"/>
               </a:ext>
               <a:ext uri="{C183D7F6-B498-43B3-948B-1728B52AA6E4}">
-                <adec:decorative xmlns="" xmlns:adec="http://schemas.microsoft.com/office/drawing/2017/decorative" val="1"/>
+                <adec:decorative xmlns:adec="http://schemas.microsoft.com/office/drawing/2017/decorative" xmlns="" val="1"/>
               </a:ext>
             </a:extLst>
           </p:cNvPr>
@@ -9988,10 +9980,10 @@
           <p:cNvPr id="10" name="Rectangle 9">
             <a:extLst>
               <a:ext uri="{FF2B5EF4-FFF2-40B4-BE49-F238E27FC236}">
-                <a16:creationId xmlns="" xmlns:a16="http://schemas.microsoft.com/office/drawing/2014/main" id="{C943A91B-7CA7-4592-A975-73B1BF8C4C74}"/>
+                <a16:creationId xmlns:a16="http://schemas.microsoft.com/office/drawing/2014/main" xmlns="" id="{C943A91B-7CA7-4592-A975-73B1BF8C4C74}"/>
               </a:ext>
               <a:ext uri="{C183D7F6-B498-43B3-948B-1728B52AA6E4}">
-                <adec:decorative xmlns="" xmlns:adec="http://schemas.microsoft.com/office/drawing/2017/decorative" val="1"/>
+                <adec:decorative xmlns:adec="http://schemas.microsoft.com/office/drawing/2017/decorative" xmlns="" val="1"/>
               </a:ext>
             </a:extLst>
           </p:cNvPr>
@@ -10041,10 +10033,10 @@
           <p:cNvPr id="12" name="Freeform 7">
             <a:extLst>
               <a:ext uri="{FF2B5EF4-FFF2-40B4-BE49-F238E27FC236}">
-                <a16:creationId xmlns="" xmlns:a16="http://schemas.microsoft.com/office/drawing/2014/main" id="{EC471314-E46A-414B-8D91-74880E84F187}"/>
+                <a16:creationId xmlns:a16="http://schemas.microsoft.com/office/drawing/2014/main" xmlns="" id="{EC471314-E46A-414B-8D91-74880E84F187}"/>
               </a:ext>
               <a:ext uri="{C183D7F6-B498-43B3-948B-1728B52AA6E4}">
-                <adec:decorative xmlns="" xmlns:adec="http://schemas.microsoft.com/office/drawing/2017/decorative" val="1"/>
+                <adec:decorative xmlns:adec="http://schemas.microsoft.com/office/drawing/2017/decorative" xmlns="" val="1"/>
               </a:ext>
             </a:extLst>
           </p:cNvPr>
@@ -10430,10 +10422,10 @@
           <p:cNvPr id="14" name="Freeform: Shape 13">
             <a:extLst>
               <a:ext uri="{FF2B5EF4-FFF2-40B4-BE49-F238E27FC236}">
-                <a16:creationId xmlns="" xmlns:a16="http://schemas.microsoft.com/office/drawing/2014/main" id="{6A681326-1C9D-44A3-A627-3871BDAE4127}"/>
+                <a16:creationId xmlns:a16="http://schemas.microsoft.com/office/drawing/2014/main" xmlns="" id="{6A681326-1C9D-44A3-A627-3871BDAE4127}"/>
               </a:ext>
               <a:ext uri="{C183D7F6-B498-43B3-948B-1728B52AA6E4}">
-                <adec:decorative xmlns="" xmlns:adec="http://schemas.microsoft.com/office/drawing/2017/decorative" val="1"/>
+                <adec:decorative xmlns:adec="http://schemas.microsoft.com/office/drawing/2017/decorative" xmlns="" val="1"/>
               </a:ext>
             </a:extLst>
           </p:cNvPr>
@@ -10893,7 +10885,7 @@
           <p:cNvPr id="2" name="Title 1">
             <a:extLst>
               <a:ext uri="{FF2B5EF4-FFF2-40B4-BE49-F238E27FC236}">
-                <a16:creationId xmlns="" xmlns:a16="http://schemas.microsoft.com/office/drawing/2014/main" id="{B7071FE9-1E09-4CD9-87A5-923A30F20AA2}"/>
+                <a16:creationId xmlns:a16="http://schemas.microsoft.com/office/drawing/2014/main" xmlns="" id="{B7071FE9-1E09-4CD9-87A5-923A30F20AA2}"/>
               </a:ext>
             </a:extLst>
           </p:cNvPr>
@@ -10932,7 +10924,7 @@
           <p:cNvPr id="3" name="Content Placeholder 2">
             <a:extLst>
               <a:ext uri="{FF2B5EF4-FFF2-40B4-BE49-F238E27FC236}">
-                <a16:creationId xmlns="" xmlns:a16="http://schemas.microsoft.com/office/drawing/2014/main" id="{5042D8AC-A055-42E8-AF39-7C9B30ED64D9}"/>
+                <a16:creationId xmlns:a16="http://schemas.microsoft.com/office/drawing/2014/main" xmlns="" id="{5042D8AC-A055-42E8-AF39-7C9B30ED64D9}"/>
               </a:ext>
             </a:extLst>
           </p:cNvPr>
@@ -11058,10 +11050,10 @@
           <p:cNvPr id="8" name="Rectangle 7">
             <a:extLst>
               <a:ext uri="{FF2B5EF4-FFF2-40B4-BE49-F238E27FC236}">
-                <a16:creationId xmlns="" xmlns:a16="http://schemas.microsoft.com/office/drawing/2014/main" id="{74CD14DB-BB81-479F-A1FC-1C75640E9F84}"/>
+                <a16:creationId xmlns:a16="http://schemas.microsoft.com/office/drawing/2014/main" xmlns="" id="{74CD14DB-BB81-479F-A1FC-1C75640E9F84}"/>
               </a:ext>
               <a:ext uri="{C183D7F6-B498-43B3-948B-1728B52AA6E4}">
-                <adec:decorative xmlns="" xmlns:adec="http://schemas.microsoft.com/office/drawing/2017/decorative" val="1"/>
+                <adec:decorative xmlns:adec="http://schemas.microsoft.com/office/drawing/2017/decorative" xmlns="" val="1"/>
               </a:ext>
             </a:extLst>
           </p:cNvPr>
@@ -11147,10 +11139,10 @@
           <p:cNvPr id="10" name="Rectangle 9">
             <a:extLst>
               <a:ext uri="{FF2B5EF4-FFF2-40B4-BE49-F238E27FC236}">
-                <a16:creationId xmlns="" xmlns:a16="http://schemas.microsoft.com/office/drawing/2014/main" id="{C943A91B-7CA7-4592-A975-73B1BF8C4C74}"/>
+                <a16:creationId xmlns:a16="http://schemas.microsoft.com/office/drawing/2014/main" xmlns="" id="{C943A91B-7CA7-4592-A975-73B1BF8C4C74}"/>
               </a:ext>
               <a:ext uri="{C183D7F6-B498-43B3-948B-1728B52AA6E4}">
-                <adec:decorative xmlns="" xmlns:adec="http://schemas.microsoft.com/office/drawing/2017/decorative" val="1"/>
+                <adec:decorative xmlns:adec="http://schemas.microsoft.com/office/drawing/2017/decorative" xmlns="" val="1"/>
               </a:ext>
             </a:extLst>
           </p:cNvPr>
@@ -11200,10 +11192,10 @@
           <p:cNvPr id="12" name="Freeform 7">
             <a:extLst>
               <a:ext uri="{FF2B5EF4-FFF2-40B4-BE49-F238E27FC236}">
-                <a16:creationId xmlns="" xmlns:a16="http://schemas.microsoft.com/office/drawing/2014/main" id="{EC471314-E46A-414B-8D91-74880E84F187}"/>
+                <a16:creationId xmlns:a16="http://schemas.microsoft.com/office/drawing/2014/main" xmlns="" id="{EC471314-E46A-414B-8D91-74880E84F187}"/>
               </a:ext>
               <a:ext uri="{C183D7F6-B498-43B3-948B-1728B52AA6E4}">
-                <adec:decorative xmlns="" xmlns:adec="http://schemas.microsoft.com/office/drawing/2017/decorative" val="1"/>
+                <adec:decorative xmlns:adec="http://schemas.microsoft.com/office/drawing/2017/decorative" xmlns="" val="1"/>
               </a:ext>
             </a:extLst>
           </p:cNvPr>
@@ -11589,10 +11581,10 @@
           <p:cNvPr id="14" name="Freeform: Shape 13">
             <a:extLst>
               <a:ext uri="{FF2B5EF4-FFF2-40B4-BE49-F238E27FC236}">
-                <a16:creationId xmlns="" xmlns:a16="http://schemas.microsoft.com/office/drawing/2014/main" id="{6A681326-1C9D-44A3-A627-3871BDAE4127}"/>
+                <a16:creationId xmlns:a16="http://schemas.microsoft.com/office/drawing/2014/main" xmlns="" id="{6A681326-1C9D-44A3-A627-3871BDAE4127}"/>
               </a:ext>
               <a:ext uri="{C183D7F6-B498-43B3-948B-1728B52AA6E4}">
-                <adec:decorative xmlns="" xmlns:adec="http://schemas.microsoft.com/office/drawing/2017/decorative" val="1"/>
+                <adec:decorative xmlns:adec="http://schemas.microsoft.com/office/drawing/2017/decorative" xmlns="" val="1"/>
               </a:ext>
             </a:extLst>
           </p:cNvPr>
@@ -12052,7 +12044,7 @@
           <p:cNvPr id="2" name="Title 1">
             <a:extLst>
               <a:ext uri="{FF2B5EF4-FFF2-40B4-BE49-F238E27FC236}">
-                <a16:creationId xmlns="" xmlns:a16="http://schemas.microsoft.com/office/drawing/2014/main" id="{B7071FE9-1E09-4CD9-87A5-923A30F20AA2}"/>
+                <a16:creationId xmlns:a16="http://schemas.microsoft.com/office/drawing/2014/main" xmlns="" id="{B7071FE9-1E09-4CD9-87A5-923A30F20AA2}"/>
               </a:ext>
             </a:extLst>
           </p:cNvPr>
@@ -12091,7 +12083,7 @@
           <p:cNvPr id="3" name="Content Placeholder 2">
             <a:extLst>
               <a:ext uri="{FF2B5EF4-FFF2-40B4-BE49-F238E27FC236}">
-                <a16:creationId xmlns="" xmlns:a16="http://schemas.microsoft.com/office/drawing/2014/main" id="{5042D8AC-A055-42E8-AF39-7C9B30ED64D9}"/>
+                <a16:creationId xmlns:a16="http://schemas.microsoft.com/office/drawing/2014/main" xmlns="" id="{5042D8AC-A055-42E8-AF39-7C9B30ED64D9}"/>
               </a:ext>
             </a:extLst>
           </p:cNvPr>
@@ -12270,7 +12262,7 @@
           <p:cNvPr id="3" name="Title 2">
             <a:extLst>
               <a:ext uri="{FF2B5EF4-FFF2-40B4-BE49-F238E27FC236}">
-                <a16:creationId xmlns="" xmlns:a16="http://schemas.microsoft.com/office/drawing/2014/main" id="{AFA0CE4D-3464-4500-9349-764B6E60CA7D}"/>
+                <a16:creationId xmlns:a16="http://schemas.microsoft.com/office/drawing/2014/main" xmlns="" id="{AFA0CE4D-3464-4500-9349-764B6E60CA7D}"/>
               </a:ext>
             </a:extLst>
           </p:cNvPr>
@@ -12395,7 +12387,7 @@
           <p:cNvPr id="2" name="Picture 1">
             <a:extLst>
               <a:ext uri="{FF2B5EF4-FFF2-40B4-BE49-F238E27FC236}">
-                <a16:creationId xmlns="" xmlns:a16="http://schemas.microsoft.com/office/drawing/2014/main" id="{264A49FB-FC71-41C8-B722-6AD7B2AF705E}"/>
+                <a16:creationId xmlns:a16="http://schemas.microsoft.com/office/drawing/2014/main" xmlns="" id="{264A49FB-FC71-41C8-B722-6AD7B2AF705E}"/>
               </a:ext>
             </a:extLst>
           </p:cNvPr>
@@ -12458,10 +12450,10 @@
           <p:cNvPr id="8" name="Rectangle 7">
             <a:extLst>
               <a:ext uri="{FF2B5EF4-FFF2-40B4-BE49-F238E27FC236}">
-                <a16:creationId xmlns="" xmlns:a16="http://schemas.microsoft.com/office/drawing/2014/main" id="{74CD14DB-BB81-479F-A1FC-1C75640E9F84}"/>
+                <a16:creationId xmlns:a16="http://schemas.microsoft.com/office/drawing/2014/main" xmlns="" id="{74CD14DB-BB81-479F-A1FC-1C75640E9F84}"/>
               </a:ext>
               <a:ext uri="{C183D7F6-B498-43B3-948B-1728B52AA6E4}">
-                <adec:decorative xmlns="" xmlns:adec="http://schemas.microsoft.com/office/drawing/2017/decorative" val="1"/>
+                <adec:decorative xmlns:adec="http://schemas.microsoft.com/office/drawing/2017/decorative" xmlns="" val="1"/>
               </a:ext>
             </a:extLst>
           </p:cNvPr>
@@ -12547,10 +12539,10 @@
           <p:cNvPr id="10" name="Rectangle 9">
             <a:extLst>
               <a:ext uri="{FF2B5EF4-FFF2-40B4-BE49-F238E27FC236}">
-                <a16:creationId xmlns="" xmlns:a16="http://schemas.microsoft.com/office/drawing/2014/main" id="{C943A91B-7CA7-4592-A975-73B1BF8C4C74}"/>
+                <a16:creationId xmlns:a16="http://schemas.microsoft.com/office/drawing/2014/main" xmlns="" id="{C943A91B-7CA7-4592-A975-73B1BF8C4C74}"/>
               </a:ext>
               <a:ext uri="{C183D7F6-B498-43B3-948B-1728B52AA6E4}">
-                <adec:decorative xmlns="" xmlns:adec="http://schemas.microsoft.com/office/drawing/2017/decorative" val="1"/>
+                <adec:decorative xmlns:adec="http://schemas.microsoft.com/office/drawing/2017/decorative" xmlns="" val="1"/>
               </a:ext>
             </a:extLst>
           </p:cNvPr>
@@ -12600,10 +12592,10 @@
           <p:cNvPr id="12" name="Freeform 7">
             <a:extLst>
               <a:ext uri="{FF2B5EF4-FFF2-40B4-BE49-F238E27FC236}">
-                <a16:creationId xmlns="" xmlns:a16="http://schemas.microsoft.com/office/drawing/2014/main" id="{EC471314-E46A-414B-8D91-74880E84F187}"/>
+                <a16:creationId xmlns:a16="http://schemas.microsoft.com/office/drawing/2014/main" xmlns="" id="{EC471314-E46A-414B-8D91-74880E84F187}"/>
               </a:ext>
               <a:ext uri="{C183D7F6-B498-43B3-948B-1728B52AA6E4}">
-                <adec:decorative xmlns="" xmlns:adec="http://schemas.microsoft.com/office/drawing/2017/decorative" val="1"/>
+                <adec:decorative xmlns:adec="http://schemas.microsoft.com/office/drawing/2017/decorative" xmlns="" val="1"/>
               </a:ext>
             </a:extLst>
           </p:cNvPr>
@@ -12989,10 +12981,10 @@
           <p:cNvPr id="14" name="Freeform: Shape 13">
             <a:extLst>
               <a:ext uri="{FF2B5EF4-FFF2-40B4-BE49-F238E27FC236}">
-                <a16:creationId xmlns="" xmlns:a16="http://schemas.microsoft.com/office/drawing/2014/main" id="{6A681326-1C9D-44A3-A627-3871BDAE4127}"/>
+                <a16:creationId xmlns:a16="http://schemas.microsoft.com/office/drawing/2014/main" xmlns="" id="{6A681326-1C9D-44A3-A627-3871BDAE4127}"/>
               </a:ext>
               <a:ext uri="{C183D7F6-B498-43B3-948B-1728B52AA6E4}">
-                <adec:decorative xmlns="" xmlns:adec="http://schemas.microsoft.com/office/drawing/2017/decorative" val="1"/>
+                <adec:decorative xmlns:adec="http://schemas.microsoft.com/office/drawing/2017/decorative" xmlns="" val="1"/>
               </a:ext>
             </a:extLst>
           </p:cNvPr>
@@ -13452,7 +13444,7 @@
           <p:cNvPr id="2" name="Title 1">
             <a:extLst>
               <a:ext uri="{FF2B5EF4-FFF2-40B4-BE49-F238E27FC236}">
-                <a16:creationId xmlns="" xmlns:a16="http://schemas.microsoft.com/office/drawing/2014/main" id="{263898C1-8DAE-4FEA-BB43-178B6C010529}"/>
+                <a16:creationId xmlns:a16="http://schemas.microsoft.com/office/drawing/2014/main" xmlns="" id="{263898C1-8DAE-4FEA-BB43-178B6C010529}"/>
               </a:ext>
             </a:extLst>
           </p:cNvPr>
@@ -13491,7 +13483,7 @@
           <p:cNvPr id="3" name="Content Placeholder 2">
             <a:extLst>
               <a:ext uri="{FF2B5EF4-FFF2-40B4-BE49-F238E27FC236}">
-                <a16:creationId xmlns="" xmlns:a16="http://schemas.microsoft.com/office/drawing/2014/main" id="{5057D010-FDE2-4A55-97BC-E2E80BF273DF}"/>
+                <a16:creationId xmlns:a16="http://schemas.microsoft.com/office/drawing/2014/main" xmlns="" id="{5057D010-FDE2-4A55-97BC-E2E80BF273DF}"/>
               </a:ext>
             </a:extLst>
           </p:cNvPr>
@@ -13640,10 +13632,10 @@
           <p:cNvPr id="8" name="Rectangle 7">
             <a:extLst>
               <a:ext uri="{FF2B5EF4-FFF2-40B4-BE49-F238E27FC236}">
-                <a16:creationId xmlns="" xmlns:a16="http://schemas.microsoft.com/office/drawing/2014/main" id="{74CD14DB-BB81-479F-A1FC-1C75640E9F84}"/>
+                <a16:creationId xmlns:a16="http://schemas.microsoft.com/office/drawing/2014/main" xmlns="" id="{74CD14DB-BB81-479F-A1FC-1C75640E9F84}"/>
               </a:ext>
               <a:ext uri="{C183D7F6-B498-43B3-948B-1728B52AA6E4}">
-                <adec:decorative xmlns="" xmlns:adec="http://schemas.microsoft.com/office/drawing/2017/decorative" val="1"/>
+                <adec:decorative xmlns:adec="http://schemas.microsoft.com/office/drawing/2017/decorative" xmlns="" val="1"/>
               </a:ext>
             </a:extLst>
           </p:cNvPr>
@@ -13729,10 +13721,10 @@
           <p:cNvPr id="10" name="Rectangle 9">
             <a:extLst>
               <a:ext uri="{FF2B5EF4-FFF2-40B4-BE49-F238E27FC236}">
-                <a16:creationId xmlns="" xmlns:a16="http://schemas.microsoft.com/office/drawing/2014/main" id="{C943A91B-7CA7-4592-A975-73B1BF8C4C74}"/>
+                <a16:creationId xmlns:a16="http://schemas.microsoft.com/office/drawing/2014/main" xmlns="" id="{C943A91B-7CA7-4592-A975-73B1BF8C4C74}"/>
               </a:ext>
               <a:ext uri="{C183D7F6-B498-43B3-948B-1728B52AA6E4}">
-                <adec:decorative xmlns="" xmlns:adec="http://schemas.microsoft.com/office/drawing/2017/decorative" val="1"/>
+                <adec:decorative xmlns:adec="http://schemas.microsoft.com/office/drawing/2017/decorative" xmlns="" val="1"/>
               </a:ext>
             </a:extLst>
           </p:cNvPr>
@@ -13782,10 +13774,10 @@
           <p:cNvPr id="12" name="Freeform 7">
             <a:extLst>
               <a:ext uri="{FF2B5EF4-FFF2-40B4-BE49-F238E27FC236}">
-                <a16:creationId xmlns="" xmlns:a16="http://schemas.microsoft.com/office/drawing/2014/main" id="{EC471314-E46A-414B-8D91-74880E84F187}"/>
+                <a16:creationId xmlns:a16="http://schemas.microsoft.com/office/drawing/2014/main" xmlns="" id="{EC471314-E46A-414B-8D91-74880E84F187}"/>
               </a:ext>
               <a:ext uri="{C183D7F6-B498-43B3-948B-1728B52AA6E4}">
-                <adec:decorative xmlns="" xmlns:adec="http://schemas.microsoft.com/office/drawing/2017/decorative" val="1"/>
+                <adec:decorative xmlns:adec="http://schemas.microsoft.com/office/drawing/2017/decorative" xmlns="" val="1"/>
               </a:ext>
             </a:extLst>
           </p:cNvPr>
@@ -14171,10 +14163,10 @@
           <p:cNvPr id="14" name="Freeform: Shape 13">
             <a:extLst>
               <a:ext uri="{FF2B5EF4-FFF2-40B4-BE49-F238E27FC236}">
-                <a16:creationId xmlns="" xmlns:a16="http://schemas.microsoft.com/office/drawing/2014/main" id="{6A681326-1C9D-44A3-A627-3871BDAE4127}"/>
+                <a16:creationId xmlns:a16="http://schemas.microsoft.com/office/drawing/2014/main" xmlns="" id="{6A681326-1C9D-44A3-A627-3871BDAE4127}"/>
               </a:ext>
               <a:ext uri="{C183D7F6-B498-43B3-948B-1728B52AA6E4}">
-                <adec:decorative xmlns="" xmlns:adec="http://schemas.microsoft.com/office/drawing/2017/decorative" val="1"/>
+                <adec:decorative xmlns:adec="http://schemas.microsoft.com/office/drawing/2017/decorative" xmlns="" val="1"/>
               </a:ext>
             </a:extLst>
           </p:cNvPr>
@@ -14634,7 +14626,7 @@
           <p:cNvPr id="2" name="Title 1">
             <a:extLst>
               <a:ext uri="{FF2B5EF4-FFF2-40B4-BE49-F238E27FC236}">
-                <a16:creationId xmlns="" xmlns:a16="http://schemas.microsoft.com/office/drawing/2014/main" id="{29FC0F62-7FF4-4075-9D16-C24BB4895B85}"/>
+                <a16:creationId xmlns:a16="http://schemas.microsoft.com/office/drawing/2014/main" xmlns="" id="{29FC0F62-7FF4-4075-9D16-C24BB4895B85}"/>
               </a:ext>
             </a:extLst>
           </p:cNvPr>
@@ -14673,7 +14665,7 @@
           <p:cNvPr id="3" name="Content Placeholder 2">
             <a:extLst>
               <a:ext uri="{FF2B5EF4-FFF2-40B4-BE49-F238E27FC236}">
-                <a16:creationId xmlns="" xmlns:a16="http://schemas.microsoft.com/office/drawing/2014/main" id="{CAE4497E-A1D2-4EDA-BC55-3E010D8490CB}"/>
+                <a16:creationId xmlns:a16="http://schemas.microsoft.com/office/drawing/2014/main" xmlns="" id="{CAE4497E-A1D2-4EDA-BC55-3E010D8490CB}"/>
               </a:ext>
             </a:extLst>
           </p:cNvPr>
@@ -14766,10 +14758,10 @@
           <p:cNvPr id="8" name="Rectangle 7">
             <a:extLst>
               <a:ext uri="{FF2B5EF4-FFF2-40B4-BE49-F238E27FC236}">
-                <a16:creationId xmlns="" xmlns:a16="http://schemas.microsoft.com/office/drawing/2014/main" id="{74CD14DB-BB81-479F-A1FC-1C75640E9F84}"/>
+                <a16:creationId xmlns:a16="http://schemas.microsoft.com/office/drawing/2014/main" xmlns="" id="{74CD14DB-BB81-479F-A1FC-1C75640E9F84}"/>
               </a:ext>
               <a:ext uri="{C183D7F6-B498-43B3-948B-1728B52AA6E4}">
-                <adec:decorative xmlns="" xmlns:adec="http://schemas.microsoft.com/office/drawing/2017/decorative" val="1"/>
+                <adec:decorative xmlns:adec="http://schemas.microsoft.com/office/drawing/2017/decorative" xmlns="" val="1"/>
               </a:ext>
             </a:extLst>
           </p:cNvPr>
@@ -14855,10 +14847,10 @@
           <p:cNvPr id="10" name="Rectangle 9">
             <a:extLst>
               <a:ext uri="{FF2B5EF4-FFF2-40B4-BE49-F238E27FC236}">
-                <a16:creationId xmlns="" xmlns:a16="http://schemas.microsoft.com/office/drawing/2014/main" id="{C943A91B-7CA7-4592-A975-73B1BF8C4C74}"/>
+                <a16:creationId xmlns:a16="http://schemas.microsoft.com/office/drawing/2014/main" xmlns="" id="{C943A91B-7CA7-4592-A975-73B1BF8C4C74}"/>
               </a:ext>
               <a:ext uri="{C183D7F6-B498-43B3-948B-1728B52AA6E4}">
-                <adec:decorative xmlns="" xmlns:adec="http://schemas.microsoft.com/office/drawing/2017/decorative" val="1"/>
+                <adec:decorative xmlns:adec="http://schemas.microsoft.com/office/drawing/2017/decorative" xmlns="" val="1"/>
               </a:ext>
             </a:extLst>
           </p:cNvPr>
@@ -14908,10 +14900,10 @@
           <p:cNvPr id="12" name="Freeform 7">
             <a:extLst>
               <a:ext uri="{FF2B5EF4-FFF2-40B4-BE49-F238E27FC236}">
-                <a16:creationId xmlns="" xmlns:a16="http://schemas.microsoft.com/office/drawing/2014/main" id="{EC471314-E46A-414B-8D91-74880E84F187}"/>
+                <a16:creationId xmlns:a16="http://schemas.microsoft.com/office/drawing/2014/main" xmlns="" id="{EC471314-E46A-414B-8D91-74880E84F187}"/>
               </a:ext>
               <a:ext uri="{C183D7F6-B498-43B3-948B-1728B52AA6E4}">
-                <adec:decorative xmlns="" xmlns:adec="http://schemas.microsoft.com/office/drawing/2017/decorative" val="1"/>
+                <adec:decorative xmlns:adec="http://schemas.microsoft.com/office/drawing/2017/decorative" xmlns="" val="1"/>
               </a:ext>
             </a:extLst>
           </p:cNvPr>
@@ -15297,10 +15289,10 @@
           <p:cNvPr id="14" name="Freeform: Shape 13">
             <a:extLst>
               <a:ext uri="{FF2B5EF4-FFF2-40B4-BE49-F238E27FC236}">
-                <a16:creationId xmlns="" xmlns:a16="http://schemas.microsoft.com/office/drawing/2014/main" id="{6A681326-1C9D-44A3-A627-3871BDAE4127}"/>
+                <a16:creationId xmlns:a16="http://schemas.microsoft.com/office/drawing/2014/main" xmlns="" id="{6A681326-1C9D-44A3-A627-3871BDAE4127}"/>
               </a:ext>
               <a:ext uri="{C183D7F6-B498-43B3-948B-1728B52AA6E4}">
-                <adec:decorative xmlns="" xmlns:adec="http://schemas.microsoft.com/office/drawing/2017/decorative" val="1"/>
+                <adec:decorative xmlns:adec="http://schemas.microsoft.com/office/drawing/2017/decorative" xmlns="" val="1"/>
               </a:ext>
             </a:extLst>
           </p:cNvPr>
@@ -15760,7 +15752,7 @@
           <p:cNvPr id="2" name="Title 1">
             <a:extLst>
               <a:ext uri="{FF2B5EF4-FFF2-40B4-BE49-F238E27FC236}">
-                <a16:creationId xmlns="" xmlns:a16="http://schemas.microsoft.com/office/drawing/2014/main" id="{29FC0F62-7FF4-4075-9D16-C24BB4895B85}"/>
+                <a16:creationId xmlns:a16="http://schemas.microsoft.com/office/drawing/2014/main" xmlns="" id="{29FC0F62-7FF4-4075-9D16-C24BB4895B85}"/>
               </a:ext>
             </a:extLst>
           </p:cNvPr>
@@ -15799,7 +15791,7 @@
           <p:cNvPr id="3" name="Content Placeholder 2">
             <a:extLst>
               <a:ext uri="{FF2B5EF4-FFF2-40B4-BE49-F238E27FC236}">
-                <a16:creationId xmlns="" xmlns:a16="http://schemas.microsoft.com/office/drawing/2014/main" id="{CAE4497E-A1D2-4EDA-BC55-3E010D8490CB}"/>
+                <a16:creationId xmlns:a16="http://schemas.microsoft.com/office/drawing/2014/main" xmlns="" id="{CAE4497E-A1D2-4EDA-BC55-3E010D8490CB}"/>
               </a:ext>
             </a:extLst>
           </p:cNvPr>
@@ -15900,10 +15892,10 @@
           <p:cNvPr id="8" name="Rectangle 7">
             <a:extLst>
               <a:ext uri="{FF2B5EF4-FFF2-40B4-BE49-F238E27FC236}">
-                <a16:creationId xmlns="" xmlns:a16="http://schemas.microsoft.com/office/drawing/2014/main" id="{74CD14DB-BB81-479F-A1FC-1C75640E9F84}"/>
+                <a16:creationId xmlns:a16="http://schemas.microsoft.com/office/drawing/2014/main" xmlns="" id="{74CD14DB-BB81-479F-A1FC-1C75640E9F84}"/>
               </a:ext>
               <a:ext uri="{C183D7F6-B498-43B3-948B-1728B52AA6E4}">
-                <adec:decorative xmlns="" xmlns:adec="http://schemas.microsoft.com/office/drawing/2017/decorative" val="1"/>
+                <adec:decorative xmlns:adec="http://schemas.microsoft.com/office/drawing/2017/decorative" xmlns="" val="1"/>
               </a:ext>
             </a:extLst>
           </p:cNvPr>
@@ -15989,10 +15981,10 @@
           <p:cNvPr id="10" name="Rectangle 9">
             <a:extLst>
               <a:ext uri="{FF2B5EF4-FFF2-40B4-BE49-F238E27FC236}">
-                <a16:creationId xmlns="" xmlns:a16="http://schemas.microsoft.com/office/drawing/2014/main" id="{C943A91B-7CA7-4592-A975-73B1BF8C4C74}"/>
+                <a16:creationId xmlns:a16="http://schemas.microsoft.com/office/drawing/2014/main" xmlns="" id="{C943A91B-7CA7-4592-A975-73B1BF8C4C74}"/>
               </a:ext>
               <a:ext uri="{C183D7F6-B498-43B3-948B-1728B52AA6E4}">
-                <adec:decorative xmlns="" xmlns:adec="http://schemas.microsoft.com/office/drawing/2017/decorative" val="1"/>
+                <adec:decorative xmlns:adec="http://schemas.microsoft.com/office/drawing/2017/decorative" xmlns="" val="1"/>
               </a:ext>
             </a:extLst>
           </p:cNvPr>
@@ -16042,10 +16034,10 @@
           <p:cNvPr id="12" name="Freeform 7">
             <a:extLst>
               <a:ext uri="{FF2B5EF4-FFF2-40B4-BE49-F238E27FC236}">
-                <a16:creationId xmlns="" xmlns:a16="http://schemas.microsoft.com/office/drawing/2014/main" id="{EC471314-E46A-414B-8D91-74880E84F187}"/>
+                <a16:creationId xmlns:a16="http://schemas.microsoft.com/office/drawing/2014/main" xmlns="" id="{EC471314-E46A-414B-8D91-74880E84F187}"/>
               </a:ext>
               <a:ext uri="{C183D7F6-B498-43B3-948B-1728B52AA6E4}">
-                <adec:decorative xmlns="" xmlns:adec="http://schemas.microsoft.com/office/drawing/2017/decorative" val="1"/>
+                <adec:decorative xmlns:adec="http://schemas.microsoft.com/office/drawing/2017/decorative" xmlns="" val="1"/>
               </a:ext>
             </a:extLst>
           </p:cNvPr>
@@ -16431,10 +16423,10 @@
           <p:cNvPr id="14" name="Freeform: Shape 13">
             <a:extLst>
               <a:ext uri="{FF2B5EF4-FFF2-40B4-BE49-F238E27FC236}">
-                <a16:creationId xmlns="" xmlns:a16="http://schemas.microsoft.com/office/drawing/2014/main" id="{6A681326-1C9D-44A3-A627-3871BDAE4127}"/>
+                <a16:creationId xmlns:a16="http://schemas.microsoft.com/office/drawing/2014/main" xmlns="" id="{6A681326-1C9D-44A3-A627-3871BDAE4127}"/>
               </a:ext>
               <a:ext uri="{C183D7F6-B498-43B3-948B-1728B52AA6E4}">
-                <adec:decorative xmlns="" xmlns:adec="http://schemas.microsoft.com/office/drawing/2017/decorative" val="1"/>
+                <adec:decorative xmlns:adec="http://schemas.microsoft.com/office/drawing/2017/decorative" xmlns="" val="1"/>
               </a:ext>
             </a:extLst>
           </p:cNvPr>
@@ -16894,7 +16886,7 @@
           <p:cNvPr id="2" name="Title 1">
             <a:extLst>
               <a:ext uri="{FF2B5EF4-FFF2-40B4-BE49-F238E27FC236}">
-                <a16:creationId xmlns="" xmlns:a16="http://schemas.microsoft.com/office/drawing/2014/main" id="{150ADC08-7161-4655-8F6F-D2582D8AEFB9}"/>
+                <a16:creationId xmlns:a16="http://schemas.microsoft.com/office/drawing/2014/main" xmlns="" id="{150ADC08-7161-4655-8F6F-D2582D8AEFB9}"/>
               </a:ext>
             </a:extLst>
           </p:cNvPr>
@@ -16933,7 +16925,7 @@
           <p:cNvPr id="3" name="Content Placeholder 2">
             <a:extLst>
               <a:ext uri="{FF2B5EF4-FFF2-40B4-BE49-F238E27FC236}">
-                <a16:creationId xmlns="" xmlns:a16="http://schemas.microsoft.com/office/drawing/2014/main" id="{23787D82-5D2C-48F1-8820-5BB4AB51EA0B}"/>
+                <a16:creationId xmlns:a16="http://schemas.microsoft.com/office/drawing/2014/main" xmlns="" id="{23787D82-5D2C-48F1-8820-5BB4AB51EA0B}"/>
               </a:ext>
             </a:extLst>
           </p:cNvPr>
@@ -17074,10 +17066,10 @@
           <p:cNvPr id="9" name="Freeform 7">
             <a:extLst>
               <a:ext uri="{FF2B5EF4-FFF2-40B4-BE49-F238E27FC236}">
-                <a16:creationId xmlns="" xmlns:a16="http://schemas.microsoft.com/office/drawing/2014/main" id="{0A01F2A2-AEDD-47DC-AFB5-B97CEB9A5328}"/>
+                <a16:creationId xmlns:a16="http://schemas.microsoft.com/office/drawing/2014/main" xmlns="" id="{0A01F2A2-AEDD-47DC-AFB5-B97CEB9A5328}"/>
               </a:ext>
               <a:ext uri="{C183D7F6-B498-43B3-948B-1728B52AA6E4}">
-                <adec:decorative xmlns="" xmlns:adec="http://schemas.microsoft.com/office/drawing/2017/decorative" val="1"/>
+                <adec:decorative xmlns:adec="http://schemas.microsoft.com/office/drawing/2017/decorative" xmlns="" val="1"/>
               </a:ext>
             </a:extLst>
           </p:cNvPr>
@@ -17438,7 +17430,7 @@
           <p:cNvPr id="2" name="Title 1">
             <a:extLst>
               <a:ext uri="{FF2B5EF4-FFF2-40B4-BE49-F238E27FC236}">
-                <a16:creationId xmlns="" xmlns:a16="http://schemas.microsoft.com/office/drawing/2014/main" id="{5F608CEC-9466-4342-BC54-86B980D37CA1}"/>
+                <a16:creationId xmlns:a16="http://schemas.microsoft.com/office/drawing/2014/main" xmlns="" id="{5F608CEC-9466-4342-BC54-86B980D37CA1}"/>
               </a:ext>
             </a:extLst>
           </p:cNvPr>
@@ -17473,10 +17465,10 @@
           <p:cNvPr id="11" name="Rectangle 10">
             <a:extLst>
               <a:ext uri="{FF2B5EF4-FFF2-40B4-BE49-F238E27FC236}">
-                <a16:creationId xmlns="" xmlns:a16="http://schemas.microsoft.com/office/drawing/2014/main" id="{DB5AF5F3-AD0A-4EFA-854A-47C780F26264}"/>
+                <a16:creationId xmlns:a16="http://schemas.microsoft.com/office/drawing/2014/main" xmlns="" id="{DB5AF5F3-AD0A-4EFA-854A-47C780F26264}"/>
               </a:ext>
               <a:ext uri="{C183D7F6-B498-43B3-948B-1728B52AA6E4}">
-                <adec:decorative xmlns="" xmlns:adec="http://schemas.microsoft.com/office/drawing/2017/decorative" val="1"/>
+                <adec:decorative xmlns:adec="http://schemas.microsoft.com/office/drawing/2017/decorative" xmlns="" val="1"/>
               </a:ext>
             </a:extLst>
           </p:cNvPr>
@@ -17536,10 +17528,10 @@
           <p:cNvPr id="13" name="Freeform 5">
             <a:extLst>
               <a:ext uri="{FF2B5EF4-FFF2-40B4-BE49-F238E27FC236}">
-                <a16:creationId xmlns="" xmlns:a16="http://schemas.microsoft.com/office/drawing/2014/main" id="{1E3D6D6C-E192-4135-B1DB-17C71EEBC946}"/>
+                <a16:creationId xmlns:a16="http://schemas.microsoft.com/office/drawing/2014/main" xmlns="" id="{1E3D6D6C-E192-4135-B1DB-17C71EEBC946}"/>
               </a:ext>
               <a:ext uri="{C183D7F6-B498-43B3-948B-1728B52AA6E4}">
-                <adec:decorative xmlns="" xmlns:adec="http://schemas.microsoft.com/office/drawing/2017/decorative" val="1"/>
+                <adec:decorative xmlns:adec="http://schemas.microsoft.com/office/drawing/2017/decorative" xmlns="" val="1"/>
               </a:ext>
             </a:extLst>
           </p:cNvPr>
@@ -17737,7 +17729,7 @@
           <p:cNvPr id="3" name="Content Placeholder 2">
             <a:extLst>
               <a:ext uri="{FF2B5EF4-FFF2-40B4-BE49-F238E27FC236}">
-                <a16:creationId xmlns="" xmlns:a16="http://schemas.microsoft.com/office/drawing/2014/main" id="{64F2927E-45A4-4852-84E6-1C38A83E559A}"/>
+                <a16:creationId xmlns:a16="http://schemas.microsoft.com/office/drawing/2014/main" xmlns="" id="{64F2927E-45A4-4852-84E6-1C38A83E559A}"/>
               </a:ext>
             </a:extLst>
           </p:cNvPr>
@@ -17814,7 +17806,7 @@
           <p:cNvPr id="4" name="Picture 3">
             <a:extLst>
               <a:ext uri="{FF2B5EF4-FFF2-40B4-BE49-F238E27FC236}">
-                <a16:creationId xmlns="" xmlns:a16="http://schemas.microsoft.com/office/drawing/2014/main" id="{631EC066-575B-4692-A853-16F6A9D6A229}"/>
+                <a16:creationId xmlns:a16="http://schemas.microsoft.com/office/drawing/2014/main" xmlns="" id="{631EC066-575B-4692-A853-16F6A9D6A229}"/>
               </a:ext>
             </a:extLst>
           </p:cNvPr>
@@ -17845,7 +17837,7 @@
           <p:cNvPr id="5" name="Picture 4">
             <a:extLst>
               <a:ext uri="{FF2B5EF4-FFF2-40B4-BE49-F238E27FC236}">
-                <a16:creationId xmlns="" xmlns:a16="http://schemas.microsoft.com/office/drawing/2014/main" id="{E7290532-A245-4850-8803-8EA1AA8E352C}"/>
+                <a16:creationId xmlns:a16="http://schemas.microsoft.com/office/drawing/2014/main" xmlns="" id="{E7290532-A245-4850-8803-8EA1AA8E352C}"/>
               </a:ext>
             </a:extLst>
           </p:cNvPr>
@@ -17913,10 +17905,10 @@
           <p:cNvPr id="8" name="Rectangle 7">
             <a:extLst>
               <a:ext uri="{FF2B5EF4-FFF2-40B4-BE49-F238E27FC236}">
-                <a16:creationId xmlns="" xmlns:a16="http://schemas.microsoft.com/office/drawing/2014/main" id="{74CD14DB-BB81-479F-A1FC-1C75640E9F84}"/>
+                <a16:creationId xmlns:a16="http://schemas.microsoft.com/office/drawing/2014/main" xmlns="" id="{74CD14DB-BB81-479F-A1FC-1C75640E9F84}"/>
               </a:ext>
               <a:ext uri="{C183D7F6-B498-43B3-948B-1728B52AA6E4}">
-                <adec:decorative xmlns="" xmlns:adec="http://schemas.microsoft.com/office/drawing/2017/decorative" val="1"/>
+                <adec:decorative xmlns:adec="http://schemas.microsoft.com/office/drawing/2017/decorative" xmlns="" val="1"/>
               </a:ext>
             </a:extLst>
           </p:cNvPr>
@@ -18002,10 +17994,10 @@
           <p:cNvPr id="10" name="Rectangle 9">
             <a:extLst>
               <a:ext uri="{FF2B5EF4-FFF2-40B4-BE49-F238E27FC236}">
-                <a16:creationId xmlns="" xmlns:a16="http://schemas.microsoft.com/office/drawing/2014/main" id="{C943A91B-7CA7-4592-A975-73B1BF8C4C74}"/>
+                <a16:creationId xmlns:a16="http://schemas.microsoft.com/office/drawing/2014/main" xmlns="" id="{C943A91B-7CA7-4592-A975-73B1BF8C4C74}"/>
               </a:ext>
               <a:ext uri="{C183D7F6-B498-43B3-948B-1728B52AA6E4}">
-                <adec:decorative xmlns="" xmlns:adec="http://schemas.microsoft.com/office/drawing/2017/decorative" val="1"/>
+                <adec:decorative xmlns:adec="http://schemas.microsoft.com/office/drawing/2017/decorative" xmlns="" val="1"/>
               </a:ext>
             </a:extLst>
           </p:cNvPr>
@@ -18055,10 +18047,10 @@
           <p:cNvPr id="12" name="Freeform 7">
             <a:extLst>
               <a:ext uri="{FF2B5EF4-FFF2-40B4-BE49-F238E27FC236}">
-                <a16:creationId xmlns="" xmlns:a16="http://schemas.microsoft.com/office/drawing/2014/main" id="{EC471314-E46A-414B-8D91-74880E84F187}"/>
+                <a16:creationId xmlns:a16="http://schemas.microsoft.com/office/drawing/2014/main" xmlns="" id="{EC471314-E46A-414B-8D91-74880E84F187}"/>
               </a:ext>
               <a:ext uri="{C183D7F6-B498-43B3-948B-1728B52AA6E4}">
-                <adec:decorative xmlns="" xmlns:adec="http://schemas.microsoft.com/office/drawing/2017/decorative" val="1"/>
+                <adec:decorative xmlns:adec="http://schemas.microsoft.com/office/drawing/2017/decorative" xmlns="" val="1"/>
               </a:ext>
             </a:extLst>
           </p:cNvPr>
@@ -18444,10 +18436,10 @@
           <p:cNvPr id="14" name="Freeform: Shape 13">
             <a:extLst>
               <a:ext uri="{FF2B5EF4-FFF2-40B4-BE49-F238E27FC236}">
-                <a16:creationId xmlns="" xmlns:a16="http://schemas.microsoft.com/office/drawing/2014/main" id="{6A681326-1C9D-44A3-A627-3871BDAE4127}"/>
+                <a16:creationId xmlns:a16="http://schemas.microsoft.com/office/drawing/2014/main" xmlns="" id="{6A681326-1C9D-44A3-A627-3871BDAE4127}"/>
               </a:ext>
               <a:ext uri="{C183D7F6-B498-43B3-948B-1728B52AA6E4}">
-                <adec:decorative xmlns="" xmlns:adec="http://schemas.microsoft.com/office/drawing/2017/decorative" val="1"/>
+                <adec:decorative xmlns:adec="http://schemas.microsoft.com/office/drawing/2017/decorative" xmlns="" val="1"/>
               </a:ext>
             </a:extLst>
           </p:cNvPr>
@@ -18907,7 +18899,7 @@
           <p:cNvPr id="2" name="Title 1">
             <a:extLst>
               <a:ext uri="{FF2B5EF4-FFF2-40B4-BE49-F238E27FC236}">
-                <a16:creationId xmlns="" xmlns:a16="http://schemas.microsoft.com/office/drawing/2014/main" id="{1F77F165-B8E5-4179-A564-A8BA486F5126}"/>
+                <a16:creationId xmlns:a16="http://schemas.microsoft.com/office/drawing/2014/main" xmlns="" id="{1F77F165-B8E5-4179-A564-A8BA486F5126}"/>
               </a:ext>
             </a:extLst>
           </p:cNvPr>
@@ -18946,7 +18938,7 @@
           <p:cNvPr id="3" name="Content Placeholder 2">
             <a:extLst>
               <a:ext uri="{FF2B5EF4-FFF2-40B4-BE49-F238E27FC236}">
-                <a16:creationId xmlns="" xmlns:a16="http://schemas.microsoft.com/office/drawing/2014/main" id="{7935E612-BB57-48B8-A4B6-8AA9ECC2018B}"/>
+                <a16:creationId xmlns:a16="http://schemas.microsoft.com/office/drawing/2014/main" xmlns="" id="{7935E612-BB57-48B8-A4B6-8AA9ECC2018B}"/>
               </a:ext>
             </a:extLst>
           </p:cNvPr>
@@ -19083,10 +19075,10 @@
           <p:cNvPr id="11" name="Freeform 7">
             <a:extLst>
               <a:ext uri="{FF2B5EF4-FFF2-40B4-BE49-F238E27FC236}">
-                <a16:creationId xmlns="" xmlns:a16="http://schemas.microsoft.com/office/drawing/2014/main" id="{0A01F2A2-AEDD-47DC-AFB5-B97CEB9A5328}"/>
+                <a16:creationId xmlns:a16="http://schemas.microsoft.com/office/drawing/2014/main" xmlns="" id="{0A01F2A2-AEDD-47DC-AFB5-B97CEB9A5328}"/>
               </a:ext>
               <a:ext uri="{C183D7F6-B498-43B3-948B-1728B52AA6E4}">
-                <adec:decorative xmlns="" xmlns:adec="http://schemas.microsoft.com/office/drawing/2017/decorative" val="1"/>
+                <adec:decorative xmlns:adec="http://schemas.microsoft.com/office/drawing/2017/decorative" xmlns="" val="1"/>
               </a:ext>
             </a:extLst>
           </p:cNvPr>
@@ -19447,7 +19439,7 @@
           <p:cNvPr id="2" name="Title 1">
             <a:extLst>
               <a:ext uri="{FF2B5EF4-FFF2-40B4-BE49-F238E27FC236}">
-                <a16:creationId xmlns="" xmlns:a16="http://schemas.microsoft.com/office/drawing/2014/main" id="{93EC96DB-8DF4-404E-BC1D-063A4D28D02D}"/>
+                <a16:creationId xmlns:a16="http://schemas.microsoft.com/office/drawing/2014/main" xmlns="" id="{93EC96DB-8DF4-404E-BC1D-063A4D28D02D}"/>
               </a:ext>
             </a:extLst>
           </p:cNvPr>
@@ -19482,10 +19474,10 @@
           <p:cNvPr id="13" name="Rectangle 12">
             <a:extLst>
               <a:ext uri="{FF2B5EF4-FFF2-40B4-BE49-F238E27FC236}">
-                <a16:creationId xmlns="" xmlns:a16="http://schemas.microsoft.com/office/drawing/2014/main" id="{DB5AF5F3-AD0A-4EFA-854A-47C780F26264}"/>
+                <a16:creationId xmlns:a16="http://schemas.microsoft.com/office/drawing/2014/main" xmlns="" id="{DB5AF5F3-AD0A-4EFA-854A-47C780F26264}"/>
               </a:ext>
               <a:ext uri="{C183D7F6-B498-43B3-948B-1728B52AA6E4}">
-                <adec:decorative xmlns="" xmlns:adec="http://schemas.microsoft.com/office/drawing/2017/decorative" val="1"/>
+                <adec:decorative xmlns:adec="http://schemas.microsoft.com/office/drawing/2017/decorative" xmlns="" val="1"/>
               </a:ext>
             </a:extLst>
           </p:cNvPr>
@@ -19545,10 +19537,10 @@
           <p:cNvPr id="15" name="Freeform 5">
             <a:extLst>
               <a:ext uri="{FF2B5EF4-FFF2-40B4-BE49-F238E27FC236}">
-                <a16:creationId xmlns="" xmlns:a16="http://schemas.microsoft.com/office/drawing/2014/main" id="{1E3D6D6C-E192-4135-B1DB-17C71EEBC946}"/>
+                <a16:creationId xmlns:a16="http://schemas.microsoft.com/office/drawing/2014/main" xmlns="" id="{1E3D6D6C-E192-4135-B1DB-17C71EEBC946}"/>
               </a:ext>
               <a:ext uri="{C183D7F6-B498-43B3-948B-1728B52AA6E4}">
-                <adec:decorative xmlns="" xmlns:adec="http://schemas.microsoft.com/office/drawing/2017/decorative" val="1"/>
+                <adec:decorative xmlns:adec="http://schemas.microsoft.com/office/drawing/2017/decorative" xmlns="" val="1"/>
               </a:ext>
             </a:extLst>
           </p:cNvPr>
@@ -19746,7 +19738,7 @@
           <p:cNvPr id="8" name="Content Placeholder 7">
             <a:extLst>
               <a:ext uri="{FF2B5EF4-FFF2-40B4-BE49-F238E27FC236}">
-                <a16:creationId xmlns="" xmlns:a16="http://schemas.microsoft.com/office/drawing/2014/main" id="{70212552-E659-45BB-B27D-9E191B39DB86}"/>
+                <a16:creationId xmlns:a16="http://schemas.microsoft.com/office/drawing/2014/main" xmlns="" id="{70212552-E659-45BB-B27D-9E191B39DB86}"/>
               </a:ext>
             </a:extLst>
           </p:cNvPr>
@@ -19851,7 +19843,7 @@
           <p:cNvPr id="4" name="Content Placeholder 3">
             <a:extLst>
               <a:ext uri="{FF2B5EF4-FFF2-40B4-BE49-F238E27FC236}">
-                <a16:creationId xmlns="" xmlns:a16="http://schemas.microsoft.com/office/drawing/2014/main" id="{95157CB1-A920-45D7-B4E5-61FA4365D29D}"/>
+                <a16:creationId xmlns:a16="http://schemas.microsoft.com/office/drawing/2014/main" xmlns="" id="{95157CB1-A920-45D7-B4E5-61FA4365D29D}"/>
               </a:ext>
             </a:extLst>
           </p:cNvPr>
@@ -19920,7 +19912,7 @@
         <p:spPr>
           <a:xfrm>
             <a:off x="754743" y="0"/>
-            <a:ext cx="10682514" cy="6858000"/>
+            <a:ext cx="10682515" cy="6858000"/>
           </a:xfrm>
         </p:spPr>
         <p:txBody>
@@ -19931,7 +19923,7 @@
           <a:p>
             <a:pPr algn="l" fontAlgn="ctr"/>
             <a:r>
-              <a:rPr lang="en-US" sz="2800" dirty="0" smtClean="0">
+              <a:rPr lang="en-US" sz="2800" dirty="0">
                 <a:latin typeface="Times New Roman" charset="0"/>
                 <a:ea typeface="Times New Roman" charset="0"/>
                 <a:cs typeface="Times New Roman" charset="0"/>
@@ -19939,14 +19931,14 @@
               <a:t>Except where otherwise noted, this work by</a:t>
             </a:r>
             <a:br>
-              <a:rPr lang="en-US" sz="2800" dirty="0" smtClean="0">
+              <a:rPr lang="en-US" sz="2800" dirty="0">
                 <a:latin typeface="Times New Roman" charset="0"/>
                 <a:ea typeface="Times New Roman" charset="0"/>
                 <a:cs typeface="Times New Roman" charset="0"/>
               </a:rPr>
             </a:br>
             <a:r>
-              <a:rPr lang="en-US" sz="2800" dirty="0" smtClean="0">
+              <a:rPr lang="en-US" sz="2800" dirty="0">
                 <a:latin typeface="Times New Roman" charset="0"/>
                 <a:ea typeface="Times New Roman" charset="0"/>
                 <a:cs typeface="Times New Roman" charset="0"/>
@@ -19954,31 +19946,56 @@
               <a:t>The Shodor Education Foundation, Inc. is licensed under</a:t>
             </a:r>
             <a:br>
-              <a:rPr lang="en-US" sz="2800" dirty="0" smtClean="0">
+              <a:rPr lang="en-US" sz="2800" dirty="0">
                 <a:latin typeface="Times New Roman" charset="0"/>
                 <a:ea typeface="Times New Roman" charset="0"/>
                 <a:cs typeface="Times New Roman" charset="0"/>
               </a:rPr>
             </a:br>
             <a:r>
-              <a:rPr lang="en-US" sz="2800" dirty="0" smtClean="0">
+              <a:rPr lang="en-US" sz="2800" dirty="0">
                 <a:latin typeface="Times New Roman" charset="0"/>
                 <a:ea typeface="Times New Roman" charset="0"/>
                 <a:cs typeface="Times New Roman" charset="0"/>
               </a:rPr>
-              <a:t>CC BY-NC 4.0. To view a copy of this license, visit </a:t>
-            </a:r>
-            <a:r>
-              <a:rPr lang="en-US" sz="2800" dirty="0" smtClean="0">
+              <a:t>CC </a:t>
+            </a:r>
+            <a:r>
+              <a:rPr lang="en-US" sz="2800" dirty="0">
+                <a:latin typeface="Times New Roman" charset="0"/>
+                <a:ea typeface="Times New Roman" charset="0"/>
+                <a:cs typeface="Times New Roman" charset="0"/>
+              </a:rPr>
+              <a:t>BY-SA </a:t>
+            </a:r>
+            <a:r>
+              <a:rPr lang="en-US" sz="2800" dirty="0">
+                <a:latin typeface="Times New Roman" charset="0"/>
+                <a:ea typeface="Times New Roman" charset="0"/>
+                <a:cs typeface="Times New Roman" charset="0"/>
+              </a:rPr>
+              <a:t>4.0. To view a copy of this license, visit </a:t>
+            </a:r>
+            <a:r>
+              <a:rPr lang="en-US" sz="2800" dirty="0">
                 <a:latin typeface="Times New Roman" charset="0"/>
                 <a:ea typeface="Times New Roman" charset="0"/>
                 <a:cs typeface="Times New Roman" charset="0"/>
                 <a:hlinkClick r:id="rId2"/>
               </a:rPr>
-              <a:t>https://creativecommons.org/licenses/by-nc/4.0</a:t>
-            </a:r>
-            <a:r>
-              <a:rPr lang="en-US" sz="2800" dirty="0" smtClean="0">
+              <a:t>https://</a:t>
+            </a:r>
+            <a:r>
+              <a:rPr lang="en-US" sz="2800" dirty="0">
+                <a:latin typeface="Times New Roman" charset="0"/>
+                <a:ea typeface="Times New Roman" charset="0"/>
+                <a:cs typeface="Times New Roman" charset="0"/>
+                <a:hlinkClick r:id="rId2"/>
+              </a:rPr>
+              <a:t>creativecommons.org/licenses/by-sa/4.0</a:t>
+            </a:r>
+            <a:r>
+              <a:rPr lang="en-US" sz="2800" dirty="0">
                 <a:latin typeface="Times New Roman" charset="0"/>
                 <a:ea typeface="Times New Roman" charset="0"/>
                 <a:cs typeface="Times New Roman" charset="0"/>
@@ -19986,14 +20003,14 @@
               <a:t/>
             </a:r>
             <a:br>
-              <a:rPr lang="en-US" sz="2800" dirty="0" smtClean="0">
+              <a:rPr lang="en-US" sz="2800" dirty="0">
                 <a:latin typeface="Times New Roman" charset="0"/>
                 <a:ea typeface="Times New Roman" charset="0"/>
                 <a:cs typeface="Times New Roman" charset="0"/>
               </a:rPr>
             </a:br>
             <a:r>
-              <a:rPr lang="en-US" sz="2800" dirty="0" smtClean="0">
+              <a:rPr lang="en-US" sz="2800" dirty="0">
                 <a:latin typeface="Times New Roman" charset="0"/>
                 <a:ea typeface="Times New Roman" charset="0"/>
                 <a:cs typeface="Times New Roman" charset="0"/>
@@ -20001,14 +20018,14 @@
               <a:t/>
             </a:r>
             <a:br>
-              <a:rPr lang="en-US" sz="2800" dirty="0" smtClean="0">
+              <a:rPr lang="en-US" sz="2800" dirty="0">
                 <a:latin typeface="Times New Roman" charset="0"/>
                 <a:ea typeface="Times New Roman" charset="0"/>
                 <a:cs typeface="Times New Roman" charset="0"/>
               </a:rPr>
             </a:br>
             <a:r>
-              <a:rPr lang="en-US" sz="2800" dirty="0" smtClean="0">
+              <a:rPr lang="en-US" sz="2800" dirty="0">
                 <a:latin typeface="Times New Roman" charset="0"/>
                 <a:ea typeface="Times New Roman" charset="0"/>
                 <a:cs typeface="Times New Roman" charset="0"/>
@@ -20016,7 +20033,7 @@
               <a:t>Browse and search the full curriculum at </a:t>
             </a:r>
             <a:r>
-              <a:rPr lang="en-US" sz="2800" dirty="0" smtClean="0">
+              <a:rPr lang="en-US" sz="2800" dirty="0">
                 <a:latin typeface="Times New Roman" charset="0"/>
                 <a:ea typeface="Times New Roman" charset="0"/>
                 <a:cs typeface="Times New Roman" charset="0"/>
@@ -20025,7 +20042,7 @@
               <a:t>http://shodor.org/petascale/materials/semester-curriculum</a:t>
             </a:r>
             <a:r>
-              <a:rPr lang="en-US" sz="2800" dirty="0" smtClean="0">
+              <a:rPr lang="en-US" sz="2800" dirty="0">
                 <a:latin typeface="Times New Roman" charset="0"/>
                 <a:ea typeface="Times New Roman" charset="0"/>
                 <a:cs typeface="Times New Roman" charset="0"/>
@@ -20033,14 +20050,14 @@
               <a:t/>
             </a:r>
             <a:br>
-              <a:rPr lang="en-US" sz="2800" dirty="0" smtClean="0">
+              <a:rPr lang="en-US" sz="2800" dirty="0">
                 <a:latin typeface="Times New Roman" charset="0"/>
                 <a:ea typeface="Times New Roman" charset="0"/>
                 <a:cs typeface="Times New Roman" charset="0"/>
               </a:rPr>
             </a:br>
             <a:r>
-              <a:rPr lang="en-US" sz="2800" dirty="0" smtClean="0">
+              <a:rPr lang="en-US" sz="2800" dirty="0">
                 <a:latin typeface="Times New Roman" charset="0"/>
                 <a:ea typeface="Times New Roman" charset="0"/>
                 <a:cs typeface="Times New Roman" charset="0"/>
@@ -20048,14 +20065,14 @@
               <a:t/>
             </a:r>
             <a:br>
-              <a:rPr lang="en-US" sz="2800" dirty="0" smtClean="0">
+              <a:rPr lang="en-US" sz="2800" dirty="0">
                 <a:latin typeface="Times New Roman" charset="0"/>
                 <a:ea typeface="Times New Roman" charset="0"/>
                 <a:cs typeface="Times New Roman" charset="0"/>
               </a:rPr>
             </a:br>
             <a:r>
-              <a:rPr lang="en-US" sz="2800" dirty="0" smtClean="0">
+              <a:rPr lang="en-US" sz="2800" dirty="0">
                 <a:latin typeface="Times New Roman" charset="0"/>
                 <a:ea typeface="Times New Roman" charset="0"/>
                 <a:cs typeface="Times New Roman" charset="0"/>
@@ -20063,7 +20080,7 @@
               <a:t>We welcome your improvements! You can submit your proposed changes to this material and the rest of the curriculum in our GitHub repository at </a:t>
             </a:r>
             <a:r>
-              <a:rPr lang="en-US" sz="2800" dirty="0" smtClean="0">
+              <a:rPr lang="en-US" sz="2800" dirty="0">
                 <a:latin typeface="Times New Roman" charset="0"/>
                 <a:ea typeface="Times New Roman" charset="0"/>
                 <a:cs typeface="Times New Roman" charset="0"/>
@@ -20072,7 +20089,7 @@
               <a:t>https://github.com/shodor-education/petascale-semester-curriculum</a:t>
             </a:r>
             <a:r>
-              <a:rPr lang="en-US" sz="2800" dirty="0" smtClean="0">
+              <a:rPr lang="en-US" sz="2800" dirty="0">
                 <a:latin typeface="Times New Roman" charset="0"/>
                 <a:ea typeface="Times New Roman" charset="0"/>
                 <a:cs typeface="Times New Roman" charset="0"/>
@@ -20080,14 +20097,14 @@
               <a:t/>
             </a:r>
             <a:br>
-              <a:rPr lang="en-US" sz="2800" dirty="0" smtClean="0">
+              <a:rPr lang="en-US" sz="2800" dirty="0">
                 <a:latin typeface="Times New Roman" charset="0"/>
                 <a:ea typeface="Times New Roman" charset="0"/>
                 <a:cs typeface="Times New Roman" charset="0"/>
               </a:rPr>
             </a:br>
             <a:r>
-              <a:rPr lang="en-US" sz="2800" dirty="0" smtClean="0">
+              <a:rPr lang="en-US" sz="2800" dirty="0">
                 <a:latin typeface="Times New Roman" charset="0"/>
                 <a:ea typeface="Times New Roman" charset="0"/>
                 <a:cs typeface="Times New Roman" charset="0"/>
@@ -20095,14 +20112,14 @@
               <a:t/>
             </a:r>
             <a:br>
-              <a:rPr lang="en-US" sz="2800" dirty="0" smtClean="0">
+              <a:rPr lang="en-US" sz="2800" dirty="0">
                 <a:latin typeface="Times New Roman" charset="0"/>
                 <a:ea typeface="Times New Roman" charset="0"/>
                 <a:cs typeface="Times New Roman" charset="0"/>
               </a:rPr>
             </a:br>
             <a:r>
-              <a:rPr lang="en-US" sz="2800" dirty="0" smtClean="0">
+              <a:rPr lang="en-US" sz="2800" dirty="0">
                 <a:latin typeface="Times New Roman" charset="0"/>
                 <a:ea typeface="Times New Roman" charset="0"/>
                 <a:cs typeface="Times New Roman" charset="0"/>
@@ -20110,7 +20127,7 @@
               <a:t>We want to hear from you! Please let us know your experiences using this material by sending email to </a:t>
             </a:r>
             <a:r>
-              <a:rPr lang="en-US" sz="2800" dirty="0" smtClean="0">
+              <a:rPr lang="en-US" sz="2800" dirty="0">
                 <a:latin typeface="Times New Roman" charset="0"/>
                 <a:ea typeface="Times New Roman" charset="0"/>
                 <a:cs typeface="Times New Roman" charset="0"/>
@@ -20129,7 +20146,7 @@
     </p:spTree>
     <p:extLst>
       <p:ext uri="{BB962C8B-B14F-4D97-AF65-F5344CB8AC3E}">
-        <p14:creationId xmlns:p14="http://schemas.microsoft.com/office/powerpoint/2010/main" val="496369106"/>
+        <p14:creationId xmlns:p14="http://schemas.microsoft.com/office/powerpoint/2010/main" val="2046251515"/>
       </p:ext>
     </p:extLst>
   </p:cSld>
@@ -20169,10 +20186,10 @@
           <p:cNvPr id="8" name="Rectangle 7">
             <a:extLst>
               <a:ext uri="{FF2B5EF4-FFF2-40B4-BE49-F238E27FC236}">
-                <a16:creationId xmlns="" xmlns:a16="http://schemas.microsoft.com/office/drawing/2014/main" id="{74CD14DB-BB81-479F-A1FC-1C75640E9F84}"/>
+                <a16:creationId xmlns:a16="http://schemas.microsoft.com/office/drawing/2014/main" xmlns="" id="{74CD14DB-BB81-479F-A1FC-1C75640E9F84}"/>
               </a:ext>
               <a:ext uri="{C183D7F6-B498-43B3-948B-1728B52AA6E4}">
-                <adec:decorative xmlns="" xmlns:adec="http://schemas.microsoft.com/office/drawing/2017/decorative" val="1"/>
+                <adec:decorative xmlns:adec="http://schemas.microsoft.com/office/drawing/2017/decorative" xmlns="" val="1"/>
               </a:ext>
             </a:extLst>
           </p:cNvPr>
@@ -20258,10 +20275,10 @@
           <p:cNvPr id="10" name="Rectangle 9">
             <a:extLst>
               <a:ext uri="{FF2B5EF4-FFF2-40B4-BE49-F238E27FC236}">
-                <a16:creationId xmlns="" xmlns:a16="http://schemas.microsoft.com/office/drawing/2014/main" id="{C943A91B-7CA7-4592-A975-73B1BF8C4C74}"/>
+                <a16:creationId xmlns:a16="http://schemas.microsoft.com/office/drawing/2014/main" xmlns="" id="{C943A91B-7CA7-4592-A975-73B1BF8C4C74}"/>
               </a:ext>
               <a:ext uri="{C183D7F6-B498-43B3-948B-1728B52AA6E4}">
-                <adec:decorative xmlns="" xmlns:adec="http://schemas.microsoft.com/office/drawing/2017/decorative" val="1"/>
+                <adec:decorative xmlns:adec="http://schemas.microsoft.com/office/drawing/2017/decorative" xmlns="" val="1"/>
               </a:ext>
             </a:extLst>
           </p:cNvPr>
@@ -20311,10 +20328,10 @@
           <p:cNvPr id="12" name="Freeform 7">
             <a:extLst>
               <a:ext uri="{FF2B5EF4-FFF2-40B4-BE49-F238E27FC236}">
-                <a16:creationId xmlns="" xmlns:a16="http://schemas.microsoft.com/office/drawing/2014/main" id="{EC471314-E46A-414B-8D91-74880E84F187}"/>
+                <a16:creationId xmlns:a16="http://schemas.microsoft.com/office/drawing/2014/main" xmlns="" id="{EC471314-E46A-414B-8D91-74880E84F187}"/>
               </a:ext>
               <a:ext uri="{C183D7F6-B498-43B3-948B-1728B52AA6E4}">
-                <adec:decorative xmlns="" xmlns:adec="http://schemas.microsoft.com/office/drawing/2017/decorative" val="1"/>
+                <adec:decorative xmlns:adec="http://schemas.microsoft.com/office/drawing/2017/decorative" xmlns="" val="1"/>
               </a:ext>
             </a:extLst>
           </p:cNvPr>
@@ -20700,10 +20717,10 @@
           <p:cNvPr id="14" name="Freeform: Shape 13">
             <a:extLst>
               <a:ext uri="{FF2B5EF4-FFF2-40B4-BE49-F238E27FC236}">
-                <a16:creationId xmlns="" xmlns:a16="http://schemas.microsoft.com/office/drawing/2014/main" id="{6A681326-1C9D-44A3-A627-3871BDAE4127}"/>
+                <a16:creationId xmlns:a16="http://schemas.microsoft.com/office/drawing/2014/main" xmlns="" id="{6A681326-1C9D-44A3-A627-3871BDAE4127}"/>
               </a:ext>
               <a:ext uri="{C183D7F6-B498-43B3-948B-1728B52AA6E4}">
-                <adec:decorative xmlns="" xmlns:adec="http://schemas.microsoft.com/office/drawing/2017/decorative" val="1"/>
+                <adec:decorative xmlns:adec="http://schemas.microsoft.com/office/drawing/2017/decorative" xmlns="" val="1"/>
               </a:ext>
             </a:extLst>
           </p:cNvPr>
@@ -21163,7 +21180,7 @@
           <p:cNvPr id="2" name="Title 1">
             <a:extLst>
               <a:ext uri="{FF2B5EF4-FFF2-40B4-BE49-F238E27FC236}">
-                <a16:creationId xmlns="" xmlns:a16="http://schemas.microsoft.com/office/drawing/2014/main" id="{2711179C-96B1-4D42-B0BC-8CDF62250646}"/>
+                <a16:creationId xmlns:a16="http://schemas.microsoft.com/office/drawing/2014/main" xmlns="" id="{2711179C-96B1-4D42-B0BC-8CDF62250646}"/>
               </a:ext>
             </a:extLst>
           </p:cNvPr>
@@ -21202,7 +21219,7 @@
           <p:cNvPr id="3" name="Content Placeholder 2">
             <a:extLst>
               <a:ext uri="{FF2B5EF4-FFF2-40B4-BE49-F238E27FC236}">
-                <a16:creationId xmlns="" xmlns:a16="http://schemas.microsoft.com/office/drawing/2014/main" id="{71224986-827F-4C31-BC4A-D3D441BBCCAB}"/>
+                <a16:creationId xmlns:a16="http://schemas.microsoft.com/office/drawing/2014/main" xmlns="" id="{71224986-827F-4C31-BC4A-D3D441BBCCAB}"/>
               </a:ext>
             </a:extLst>
           </p:cNvPr>
@@ -21301,10 +21318,10 @@
           <p:cNvPr id="8" name="Rectangle 7">
             <a:extLst>
               <a:ext uri="{FF2B5EF4-FFF2-40B4-BE49-F238E27FC236}">
-                <a16:creationId xmlns="" xmlns:a16="http://schemas.microsoft.com/office/drawing/2014/main" id="{74CD14DB-BB81-479F-A1FC-1C75640E9F84}"/>
+                <a16:creationId xmlns:a16="http://schemas.microsoft.com/office/drawing/2014/main" xmlns="" id="{74CD14DB-BB81-479F-A1FC-1C75640E9F84}"/>
               </a:ext>
               <a:ext uri="{C183D7F6-B498-43B3-948B-1728B52AA6E4}">
-                <adec:decorative xmlns="" xmlns:adec="http://schemas.microsoft.com/office/drawing/2017/decorative" val="1"/>
+                <adec:decorative xmlns:adec="http://schemas.microsoft.com/office/drawing/2017/decorative" xmlns="" val="1"/>
               </a:ext>
             </a:extLst>
           </p:cNvPr>
@@ -21390,10 +21407,10 @@
           <p:cNvPr id="10" name="Rectangle 9">
             <a:extLst>
               <a:ext uri="{FF2B5EF4-FFF2-40B4-BE49-F238E27FC236}">
-                <a16:creationId xmlns="" xmlns:a16="http://schemas.microsoft.com/office/drawing/2014/main" id="{C943A91B-7CA7-4592-A975-73B1BF8C4C74}"/>
+                <a16:creationId xmlns:a16="http://schemas.microsoft.com/office/drawing/2014/main" xmlns="" id="{C943A91B-7CA7-4592-A975-73B1BF8C4C74}"/>
               </a:ext>
               <a:ext uri="{C183D7F6-B498-43B3-948B-1728B52AA6E4}">
-                <adec:decorative xmlns="" xmlns:adec="http://schemas.microsoft.com/office/drawing/2017/decorative" val="1"/>
+                <adec:decorative xmlns:adec="http://schemas.microsoft.com/office/drawing/2017/decorative" xmlns="" val="1"/>
               </a:ext>
             </a:extLst>
           </p:cNvPr>
@@ -21443,10 +21460,10 @@
           <p:cNvPr id="12" name="Freeform 7">
             <a:extLst>
               <a:ext uri="{FF2B5EF4-FFF2-40B4-BE49-F238E27FC236}">
-                <a16:creationId xmlns="" xmlns:a16="http://schemas.microsoft.com/office/drawing/2014/main" id="{EC471314-E46A-414B-8D91-74880E84F187}"/>
+                <a16:creationId xmlns:a16="http://schemas.microsoft.com/office/drawing/2014/main" xmlns="" id="{EC471314-E46A-414B-8D91-74880E84F187}"/>
               </a:ext>
               <a:ext uri="{C183D7F6-B498-43B3-948B-1728B52AA6E4}">
-                <adec:decorative xmlns="" xmlns:adec="http://schemas.microsoft.com/office/drawing/2017/decorative" val="1"/>
+                <adec:decorative xmlns:adec="http://schemas.microsoft.com/office/drawing/2017/decorative" xmlns="" val="1"/>
               </a:ext>
             </a:extLst>
           </p:cNvPr>
@@ -21832,10 +21849,10 @@
           <p:cNvPr id="14" name="Freeform: Shape 13">
             <a:extLst>
               <a:ext uri="{FF2B5EF4-FFF2-40B4-BE49-F238E27FC236}">
-                <a16:creationId xmlns="" xmlns:a16="http://schemas.microsoft.com/office/drawing/2014/main" id="{6A681326-1C9D-44A3-A627-3871BDAE4127}"/>
+                <a16:creationId xmlns:a16="http://schemas.microsoft.com/office/drawing/2014/main" xmlns="" id="{6A681326-1C9D-44A3-A627-3871BDAE4127}"/>
               </a:ext>
               <a:ext uri="{C183D7F6-B498-43B3-948B-1728B52AA6E4}">
-                <adec:decorative xmlns="" xmlns:adec="http://schemas.microsoft.com/office/drawing/2017/decorative" val="1"/>
+                <adec:decorative xmlns:adec="http://schemas.microsoft.com/office/drawing/2017/decorative" xmlns="" val="1"/>
               </a:ext>
             </a:extLst>
           </p:cNvPr>
@@ -22295,7 +22312,7 @@
           <p:cNvPr id="2" name="Title 1">
             <a:extLst>
               <a:ext uri="{FF2B5EF4-FFF2-40B4-BE49-F238E27FC236}">
-                <a16:creationId xmlns="" xmlns:a16="http://schemas.microsoft.com/office/drawing/2014/main" id="{2711179C-96B1-4D42-B0BC-8CDF62250646}"/>
+                <a16:creationId xmlns:a16="http://schemas.microsoft.com/office/drawing/2014/main" xmlns="" id="{2711179C-96B1-4D42-B0BC-8CDF62250646}"/>
               </a:ext>
             </a:extLst>
           </p:cNvPr>
@@ -22339,7 +22356,7 @@
           <p:cNvPr id="5" name="Content Placeholder 4">
             <a:extLst>
               <a:ext uri="{FF2B5EF4-FFF2-40B4-BE49-F238E27FC236}">
-                <a16:creationId xmlns="" xmlns:a16="http://schemas.microsoft.com/office/drawing/2014/main" id="{EC921AED-FDE2-4B28-9DBC-BB869C73481A}"/>
+                <a16:creationId xmlns:a16="http://schemas.microsoft.com/office/drawing/2014/main" xmlns="" id="{EC921AED-FDE2-4B28-9DBC-BB869C73481A}"/>
               </a:ext>
             </a:extLst>
           </p:cNvPr>
@@ -22414,7 +22431,7 @@
                 <a:hlinkClick r:id="rId2">
                   <a:extLst>
                     <a:ext uri="{A12FA001-AC4F-418D-AE19-62706E023703}">
-                      <ahyp:hlinkClr xmlns="" xmlns:ahyp="http://schemas.microsoft.com/office/drawing/2018/hyperlinkcolor" val="tx"/>
+                      <ahyp:hlinkClr xmlns:ahyp="http://schemas.microsoft.com/office/drawing/2018/hyperlinkcolor" xmlns="" val="tx"/>
                     </a:ext>
                   </a:extLst>
                 </a:hlinkClick>
@@ -22478,10 +22495,10 @@
           <p:cNvPr id="8" name="Rectangle 7">
             <a:extLst>
               <a:ext uri="{FF2B5EF4-FFF2-40B4-BE49-F238E27FC236}">
-                <a16:creationId xmlns="" xmlns:a16="http://schemas.microsoft.com/office/drawing/2014/main" id="{74CD14DB-BB81-479F-A1FC-1C75640E9F84}"/>
+                <a16:creationId xmlns:a16="http://schemas.microsoft.com/office/drawing/2014/main" xmlns="" id="{74CD14DB-BB81-479F-A1FC-1C75640E9F84}"/>
               </a:ext>
               <a:ext uri="{C183D7F6-B498-43B3-948B-1728B52AA6E4}">
-                <adec:decorative xmlns="" xmlns:adec="http://schemas.microsoft.com/office/drawing/2017/decorative" val="1"/>
+                <adec:decorative xmlns:adec="http://schemas.microsoft.com/office/drawing/2017/decorative" xmlns="" val="1"/>
               </a:ext>
             </a:extLst>
           </p:cNvPr>
@@ -22567,10 +22584,10 @@
           <p:cNvPr id="10" name="Rectangle 9">
             <a:extLst>
               <a:ext uri="{FF2B5EF4-FFF2-40B4-BE49-F238E27FC236}">
-                <a16:creationId xmlns="" xmlns:a16="http://schemas.microsoft.com/office/drawing/2014/main" id="{C943A91B-7CA7-4592-A975-73B1BF8C4C74}"/>
+                <a16:creationId xmlns:a16="http://schemas.microsoft.com/office/drawing/2014/main" xmlns="" id="{C943A91B-7CA7-4592-A975-73B1BF8C4C74}"/>
               </a:ext>
               <a:ext uri="{C183D7F6-B498-43B3-948B-1728B52AA6E4}">
-                <adec:decorative xmlns="" xmlns:adec="http://schemas.microsoft.com/office/drawing/2017/decorative" val="1"/>
+                <adec:decorative xmlns:adec="http://schemas.microsoft.com/office/drawing/2017/decorative" xmlns="" val="1"/>
               </a:ext>
             </a:extLst>
           </p:cNvPr>
@@ -22620,10 +22637,10 @@
           <p:cNvPr id="12" name="Freeform 7">
             <a:extLst>
               <a:ext uri="{FF2B5EF4-FFF2-40B4-BE49-F238E27FC236}">
-                <a16:creationId xmlns="" xmlns:a16="http://schemas.microsoft.com/office/drawing/2014/main" id="{EC471314-E46A-414B-8D91-74880E84F187}"/>
+                <a16:creationId xmlns:a16="http://schemas.microsoft.com/office/drawing/2014/main" xmlns="" id="{EC471314-E46A-414B-8D91-74880E84F187}"/>
               </a:ext>
               <a:ext uri="{C183D7F6-B498-43B3-948B-1728B52AA6E4}">
-                <adec:decorative xmlns="" xmlns:adec="http://schemas.microsoft.com/office/drawing/2017/decorative" val="1"/>
+                <adec:decorative xmlns:adec="http://schemas.microsoft.com/office/drawing/2017/decorative" xmlns="" val="1"/>
               </a:ext>
             </a:extLst>
           </p:cNvPr>
@@ -23009,10 +23026,10 @@
           <p:cNvPr id="14" name="Freeform: Shape 13">
             <a:extLst>
               <a:ext uri="{FF2B5EF4-FFF2-40B4-BE49-F238E27FC236}">
-                <a16:creationId xmlns="" xmlns:a16="http://schemas.microsoft.com/office/drawing/2014/main" id="{6A681326-1C9D-44A3-A627-3871BDAE4127}"/>
+                <a16:creationId xmlns:a16="http://schemas.microsoft.com/office/drawing/2014/main" xmlns="" id="{6A681326-1C9D-44A3-A627-3871BDAE4127}"/>
               </a:ext>
               <a:ext uri="{C183D7F6-B498-43B3-948B-1728B52AA6E4}">
-                <adec:decorative xmlns="" xmlns:adec="http://schemas.microsoft.com/office/drawing/2017/decorative" val="1"/>
+                <adec:decorative xmlns:adec="http://schemas.microsoft.com/office/drawing/2017/decorative" xmlns="" val="1"/>
               </a:ext>
             </a:extLst>
           </p:cNvPr>
@@ -23472,7 +23489,7 @@
           <p:cNvPr id="2" name="Title 1">
             <a:extLst>
               <a:ext uri="{FF2B5EF4-FFF2-40B4-BE49-F238E27FC236}">
-                <a16:creationId xmlns="" xmlns:a16="http://schemas.microsoft.com/office/drawing/2014/main" id="{2711179C-96B1-4D42-B0BC-8CDF62250646}"/>
+                <a16:creationId xmlns:a16="http://schemas.microsoft.com/office/drawing/2014/main" xmlns="" id="{2711179C-96B1-4D42-B0BC-8CDF62250646}"/>
               </a:ext>
             </a:extLst>
           </p:cNvPr>
@@ -23511,7 +23528,7 @@
           <p:cNvPr id="4" name="Content Placeholder 3">
             <a:extLst>
               <a:ext uri="{FF2B5EF4-FFF2-40B4-BE49-F238E27FC236}">
-                <a16:creationId xmlns="" xmlns:a16="http://schemas.microsoft.com/office/drawing/2014/main" id="{8E88AC2F-32DA-4087-9D9F-1242A2932F19}"/>
+                <a16:creationId xmlns:a16="http://schemas.microsoft.com/office/drawing/2014/main" xmlns="" id="{8E88AC2F-32DA-4087-9D9F-1242A2932F19}"/>
               </a:ext>
             </a:extLst>
           </p:cNvPr>
@@ -23594,10 +23611,10 @@
           <p:cNvPr id="8" name="Rectangle 7">
             <a:extLst>
               <a:ext uri="{FF2B5EF4-FFF2-40B4-BE49-F238E27FC236}">
-                <a16:creationId xmlns="" xmlns:a16="http://schemas.microsoft.com/office/drawing/2014/main" id="{DE27238C-8EAF-4098-86E6-7723B7DAE601}"/>
+                <a16:creationId xmlns:a16="http://schemas.microsoft.com/office/drawing/2014/main" xmlns="" id="{DE27238C-8EAF-4098-86E6-7723B7DAE601}"/>
               </a:ext>
               <a:ext uri="{C183D7F6-B498-43B3-948B-1728B52AA6E4}">
-                <adec:decorative xmlns="" xmlns:adec="http://schemas.microsoft.com/office/drawing/2017/decorative" val="1"/>
+                <adec:decorative xmlns:adec="http://schemas.microsoft.com/office/drawing/2017/decorative" xmlns="" val="1"/>
               </a:ext>
             </a:extLst>
           </p:cNvPr>
@@ -23657,10 +23674,10 @@
           <p:cNvPr id="10" name="Freeform 36">
             <a:extLst>
               <a:ext uri="{FF2B5EF4-FFF2-40B4-BE49-F238E27FC236}">
-                <a16:creationId xmlns="" xmlns:a16="http://schemas.microsoft.com/office/drawing/2014/main" id="{992F97B1-1891-4FCC-9E5F-BA97EDB48F89}"/>
+                <a16:creationId xmlns:a16="http://schemas.microsoft.com/office/drawing/2014/main" xmlns="" id="{992F97B1-1891-4FCC-9E5F-BA97EDB48F89}"/>
               </a:ext>
               <a:ext uri="{C183D7F6-B498-43B3-948B-1728B52AA6E4}">
-                <adec:decorative xmlns="" xmlns:adec="http://schemas.microsoft.com/office/drawing/2017/decorative" val="1"/>
+                <adec:decorative xmlns:adec="http://schemas.microsoft.com/office/drawing/2017/decorative" xmlns="" val="1"/>
               </a:ext>
             </a:extLst>
           </p:cNvPr>
@@ -24011,10 +24028,10 @@
           <p:cNvPr id="12" name="Freeform: Shape 11">
             <a:extLst>
               <a:ext uri="{FF2B5EF4-FFF2-40B4-BE49-F238E27FC236}">
-                <a16:creationId xmlns="" xmlns:a16="http://schemas.microsoft.com/office/drawing/2014/main" id="{78C6C821-FEE1-4EB6-9590-C021440C77DE}"/>
+                <a16:creationId xmlns:a16="http://schemas.microsoft.com/office/drawing/2014/main" xmlns="" id="{78C6C821-FEE1-4EB6-9590-C021440C77DE}"/>
               </a:ext>
               <a:ext uri="{C183D7F6-B498-43B3-948B-1728B52AA6E4}">
-                <adec:decorative xmlns="" xmlns:adec="http://schemas.microsoft.com/office/drawing/2017/decorative" val="1"/>
+                <adec:decorative xmlns:adec="http://schemas.microsoft.com/office/drawing/2017/decorative" xmlns="" val="1"/>
               </a:ext>
             </a:extLst>
           </p:cNvPr>
@@ -24555,7 +24572,7 @@
           <p:cNvPr id="2" name="Title 1">
             <a:extLst>
               <a:ext uri="{FF2B5EF4-FFF2-40B4-BE49-F238E27FC236}">
-                <a16:creationId xmlns="" xmlns:a16="http://schemas.microsoft.com/office/drawing/2014/main" id="{B4A50DC5-78F7-43A1-BB91-7DBF8F6AEF90}"/>
+                <a16:creationId xmlns:a16="http://schemas.microsoft.com/office/drawing/2014/main" xmlns="" id="{B4A50DC5-78F7-43A1-BB91-7DBF8F6AEF90}"/>
               </a:ext>
             </a:extLst>
           </p:cNvPr>
@@ -24607,10 +24624,10 @@
           <p:cNvPr id="14" name="Rectangle 13">
             <a:extLst>
               <a:ext uri="{FF2B5EF4-FFF2-40B4-BE49-F238E27FC236}">
-                <a16:creationId xmlns="" xmlns:a16="http://schemas.microsoft.com/office/drawing/2014/main" id="{B61A74B3-E247-44D4-8C48-FAE8E2056401}"/>
+                <a16:creationId xmlns:a16="http://schemas.microsoft.com/office/drawing/2014/main" xmlns="" id="{B61A74B3-E247-44D4-8C48-FAE8E2056401}"/>
               </a:ext>
               <a:ext uri="{C183D7F6-B498-43B3-948B-1728B52AA6E4}">
-                <adec:decorative xmlns="" xmlns:adec="http://schemas.microsoft.com/office/drawing/2017/decorative" val="1"/>
+                <adec:decorative xmlns:adec="http://schemas.microsoft.com/office/drawing/2017/decorative" xmlns="" val="1"/>
               </a:ext>
             </a:extLst>
           </p:cNvPr>
@@ -24698,10 +24715,10 @@
           <p:cNvPr id="8" name="Rectangle 7">
             <a:extLst>
               <a:ext uri="{FF2B5EF4-FFF2-40B4-BE49-F238E27FC236}">
-                <a16:creationId xmlns="" xmlns:a16="http://schemas.microsoft.com/office/drawing/2014/main" id="{74CD14DB-BB81-479F-A1FC-1C75640E9F84}"/>
+                <a16:creationId xmlns:a16="http://schemas.microsoft.com/office/drawing/2014/main" xmlns="" id="{74CD14DB-BB81-479F-A1FC-1C75640E9F84}"/>
               </a:ext>
               <a:ext uri="{C183D7F6-B498-43B3-948B-1728B52AA6E4}">
-                <adec:decorative xmlns="" xmlns:adec="http://schemas.microsoft.com/office/drawing/2017/decorative" val="1"/>
+                <adec:decorative xmlns:adec="http://schemas.microsoft.com/office/drawing/2017/decorative" xmlns="" val="1"/>
               </a:ext>
             </a:extLst>
           </p:cNvPr>
@@ -24787,10 +24804,10 @@
           <p:cNvPr id="10" name="Rectangle 9">
             <a:extLst>
               <a:ext uri="{FF2B5EF4-FFF2-40B4-BE49-F238E27FC236}">
-                <a16:creationId xmlns="" xmlns:a16="http://schemas.microsoft.com/office/drawing/2014/main" id="{C943A91B-7CA7-4592-A975-73B1BF8C4C74}"/>
+                <a16:creationId xmlns:a16="http://schemas.microsoft.com/office/drawing/2014/main" xmlns="" id="{C943A91B-7CA7-4592-A975-73B1BF8C4C74}"/>
               </a:ext>
               <a:ext uri="{C183D7F6-B498-43B3-948B-1728B52AA6E4}">
-                <adec:decorative xmlns="" xmlns:adec="http://schemas.microsoft.com/office/drawing/2017/decorative" val="1"/>
+                <adec:decorative xmlns:adec="http://schemas.microsoft.com/office/drawing/2017/decorative" xmlns="" val="1"/>
               </a:ext>
             </a:extLst>
           </p:cNvPr>
@@ -24840,10 +24857,10 @@
           <p:cNvPr id="12" name="Freeform 7">
             <a:extLst>
               <a:ext uri="{FF2B5EF4-FFF2-40B4-BE49-F238E27FC236}">
-                <a16:creationId xmlns="" xmlns:a16="http://schemas.microsoft.com/office/drawing/2014/main" id="{EC471314-E46A-414B-8D91-74880E84F187}"/>
+                <a16:creationId xmlns:a16="http://schemas.microsoft.com/office/drawing/2014/main" xmlns="" id="{EC471314-E46A-414B-8D91-74880E84F187}"/>
               </a:ext>
               <a:ext uri="{C183D7F6-B498-43B3-948B-1728B52AA6E4}">
-                <adec:decorative xmlns="" xmlns:adec="http://schemas.microsoft.com/office/drawing/2017/decorative" val="1"/>
+                <adec:decorative xmlns:adec="http://schemas.microsoft.com/office/drawing/2017/decorative" xmlns="" val="1"/>
               </a:ext>
             </a:extLst>
           </p:cNvPr>
@@ -25229,10 +25246,10 @@
           <p:cNvPr id="14" name="Freeform: Shape 13">
             <a:extLst>
               <a:ext uri="{FF2B5EF4-FFF2-40B4-BE49-F238E27FC236}">
-                <a16:creationId xmlns="" xmlns:a16="http://schemas.microsoft.com/office/drawing/2014/main" id="{6A681326-1C9D-44A3-A627-3871BDAE4127}"/>
+                <a16:creationId xmlns:a16="http://schemas.microsoft.com/office/drawing/2014/main" xmlns="" id="{6A681326-1C9D-44A3-A627-3871BDAE4127}"/>
               </a:ext>
               <a:ext uri="{C183D7F6-B498-43B3-948B-1728B52AA6E4}">
-                <adec:decorative xmlns="" xmlns:adec="http://schemas.microsoft.com/office/drawing/2017/decorative" val="1"/>
+                <adec:decorative xmlns:adec="http://schemas.microsoft.com/office/drawing/2017/decorative" xmlns="" val="1"/>
               </a:ext>
             </a:extLst>
           </p:cNvPr>
@@ -25692,7 +25709,7 @@
           <p:cNvPr id="2" name="Title 1">
             <a:extLst>
               <a:ext uri="{FF2B5EF4-FFF2-40B4-BE49-F238E27FC236}">
-                <a16:creationId xmlns="" xmlns:a16="http://schemas.microsoft.com/office/drawing/2014/main" id="{5343FD55-52BA-49ED-8622-99BA403F87BD}"/>
+                <a16:creationId xmlns:a16="http://schemas.microsoft.com/office/drawing/2014/main" xmlns="" id="{5343FD55-52BA-49ED-8622-99BA403F87BD}"/>
               </a:ext>
             </a:extLst>
           </p:cNvPr>
@@ -25731,7 +25748,7 @@
           <p:cNvPr id="3" name="Content Placeholder 2">
             <a:extLst>
               <a:ext uri="{FF2B5EF4-FFF2-40B4-BE49-F238E27FC236}">
-                <a16:creationId xmlns="" xmlns:a16="http://schemas.microsoft.com/office/drawing/2014/main" id="{03D921A0-DB4F-49E7-B69F-84CE55C2AD6E}"/>
+                <a16:creationId xmlns:a16="http://schemas.microsoft.com/office/drawing/2014/main" xmlns="" id="{03D921A0-DB4F-49E7-B69F-84CE55C2AD6E}"/>
               </a:ext>
             </a:extLst>
           </p:cNvPr>
@@ -25853,10 +25870,10 @@
           <p:cNvPr id="8" name="Rectangle 7">
             <a:extLst>
               <a:ext uri="{FF2B5EF4-FFF2-40B4-BE49-F238E27FC236}">
-                <a16:creationId xmlns="" xmlns:a16="http://schemas.microsoft.com/office/drawing/2014/main" id="{74CD14DB-BB81-479F-A1FC-1C75640E9F84}"/>
+                <a16:creationId xmlns:a16="http://schemas.microsoft.com/office/drawing/2014/main" xmlns="" id="{74CD14DB-BB81-479F-A1FC-1C75640E9F84}"/>
               </a:ext>
               <a:ext uri="{C183D7F6-B498-43B3-948B-1728B52AA6E4}">
-                <adec:decorative xmlns="" xmlns:adec="http://schemas.microsoft.com/office/drawing/2017/decorative" val="1"/>
+                <adec:decorative xmlns:adec="http://schemas.microsoft.com/office/drawing/2017/decorative" xmlns="" val="1"/>
               </a:ext>
             </a:extLst>
           </p:cNvPr>
@@ -25942,10 +25959,10 @@
           <p:cNvPr id="10" name="Rectangle 9">
             <a:extLst>
               <a:ext uri="{FF2B5EF4-FFF2-40B4-BE49-F238E27FC236}">
-                <a16:creationId xmlns="" xmlns:a16="http://schemas.microsoft.com/office/drawing/2014/main" id="{C943A91B-7CA7-4592-A975-73B1BF8C4C74}"/>
+                <a16:creationId xmlns:a16="http://schemas.microsoft.com/office/drawing/2014/main" xmlns="" id="{C943A91B-7CA7-4592-A975-73B1BF8C4C74}"/>
               </a:ext>
               <a:ext uri="{C183D7F6-B498-43B3-948B-1728B52AA6E4}">
-                <adec:decorative xmlns="" xmlns:adec="http://schemas.microsoft.com/office/drawing/2017/decorative" val="1"/>
+                <adec:decorative xmlns:adec="http://schemas.microsoft.com/office/drawing/2017/decorative" xmlns="" val="1"/>
               </a:ext>
             </a:extLst>
           </p:cNvPr>
@@ -25995,10 +26012,10 @@
           <p:cNvPr id="12" name="Freeform 7">
             <a:extLst>
               <a:ext uri="{FF2B5EF4-FFF2-40B4-BE49-F238E27FC236}">
-                <a16:creationId xmlns="" xmlns:a16="http://schemas.microsoft.com/office/drawing/2014/main" id="{EC471314-E46A-414B-8D91-74880E84F187}"/>
+                <a16:creationId xmlns:a16="http://schemas.microsoft.com/office/drawing/2014/main" xmlns="" id="{EC471314-E46A-414B-8D91-74880E84F187}"/>
               </a:ext>
               <a:ext uri="{C183D7F6-B498-43B3-948B-1728B52AA6E4}">
-                <adec:decorative xmlns="" xmlns:adec="http://schemas.microsoft.com/office/drawing/2017/decorative" val="1"/>
+                <adec:decorative xmlns:adec="http://schemas.microsoft.com/office/drawing/2017/decorative" xmlns="" val="1"/>
               </a:ext>
             </a:extLst>
           </p:cNvPr>
@@ -26384,10 +26401,10 @@
           <p:cNvPr id="14" name="Freeform: Shape 13">
             <a:extLst>
               <a:ext uri="{FF2B5EF4-FFF2-40B4-BE49-F238E27FC236}">
-                <a16:creationId xmlns="" xmlns:a16="http://schemas.microsoft.com/office/drawing/2014/main" id="{6A681326-1C9D-44A3-A627-3871BDAE4127}"/>
+                <a16:creationId xmlns:a16="http://schemas.microsoft.com/office/drawing/2014/main" xmlns="" id="{6A681326-1C9D-44A3-A627-3871BDAE4127}"/>
               </a:ext>
               <a:ext uri="{C183D7F6-B498-43B3-948B-1728B52AA6E4}">
-                <adec:decorative xmlns="" xmlns:adec="http://schemas.microsoft.com/office/drawing/2017/decorative" val="1"/>
+                <adec:decorative xmlns:adec="http://schemas.microsoft.com/office/drawing/2017/decorative" xmlns="" val="1"/>
               </a:ext>
             </a:extLst>
           </p:cNvPr>
@@ -26847,7 +26864,7 @@
           <p:cNvPr id="2" name="Title 1">
             <a:extLst>
               <a:ext uri="{FF2B5EF4-FFF2-40B4-BE49-F238E27FC236}">
-                <a16:creationId xmlns="" xmlns:a16="http://schemas.microsoft.com/office/drawing/2014/main" id="{12E011C1-9465-414E-ADAE-ED2F0ABA662D}"/>
+                <a16:creationId xmlns:a16="http://schemas.microsoft.com/office/drawing/2014/main" xmlns="" id="{12E011C1-9465-414E-ADAE-ED2F0ABA662D}"/>
               </a:ext>
             </a:extLst>
           </p:cNvPr>
@@ -26886,7 +26903,7 @@
           <p:cNvPr id="3" name="Content Placeholder 2">
             <a:extLst>
               <a:ext uri="{FF2B5EF4-FFF2-40B4-BE49-F238E27FC236}">
-                <a16:creationId xmlns="" xmlns:a16="http://schemas.microsoft.com/office/drawing/2014/main" id="{07FDBAD7-EFC7-40EA-A7BA-03E336B3FE72}"/>
+                <a16:creationId xmlns:a16="http://schemas.microsoft.com/office/drawing/2014/main" xmlns="" id="{07FDBAD7-EFC7-40EA-A7BA-03E336B3FE72}"/>
               </a:ext>
             </a:extLst>
           </p:cNvPr>
@@ -27008,10 +27025,10 @@
           <p:cNvPr id="8" name="Rectangle 7">
             <a:extLst>
               <a:ext uri="{FF2B5EF4-FFF2-40B4-BE49-F238E27FC236}">
-                <a16:creationId xmlns="" xmlns:a16="http://schemas.microsoft.com/office/drawing/2014/main" id="{74CD14DB-BB81-479F-A1FC-1C75640E9F84}"/>
+                <a16:creationId xmlns:a16="http://schemas.microsoft.com/office/drawing/2014/main" xmlns="" id="{74CD14DB-BB81-479F-A1FC-1C75640E9F84}"/>
               </a:ext>
               <a:ext uri="{C183D7F6-B498-43B3-948B-1728B52AA6E4}">
-                <adec:decorative xmlns="" xmlns:adec="http://schemas.microsoft.com/office/drawing/2017/decorative" val="1"/>
+                <adec:decorative xmlns:adec="http://schemas.microsoft.com/office/drawing/2017/decorative" xmlns="" val="1"/>
               </a:ext>
             </a:extLst>
           </p:cNvPr>
@@ -27097,10 +27114,10 @@
           <p:cNvPr id="10" name="Rectangle 9">
             <a:extLst>
               <a:ext uri="{FF2B5EF4-FFF2-40B4-BE49-F238E27FC236}">
-                <a16:creationId xmlns="" xmlns:a16="http://schemas.microsoft.com/office/drawing/2014/main" id="{C943A91B-7CA7-4592-A975-73B1BF8C4C74}"/>
+                <a16:creationId xmlns:a16="http://schemas.microsoft.com/office/drawing/2014/main" xmlns="" id="{C943A91B-7CA7-4592-A975-73B1BF8C4C74}"/>
               </a:ext>
               <a:ext uri="{C183D7F6-B498-43B3-948B-1728B52AA6E4}">
-                <adec:decorative xmlns="" xmlns:adec="http://schemas.microsoft.com/office/drawing/2017/decorative" val="1"/>
+                <adec:decorative xmlns:adec="http://schemas.microsoft.com/office/drawing/2017/decorative" xmlns="" val="1"/>
               </a:ext>
             </a:extLst>
           </p:cNvPr>
@@ -27150,10 +27167,10 @@
           <p:cNvPr id="12" name="Freeform 7">
             <a:extLst>
               <a:ext uri="{FF2B5EF4-FFF2-40B4-BE49-F238E27FC236}">
-                <a16:creationId xmlns="" xmlns:a16="http://schemas.microsoft.com/office/drawing/2014/main" id="{EC471314-E46A-414B-8D91-74880E84F187}"/>
+                <a16:creationId xmlns:a16="http://schemas.microsoft.com/office/drawing/2014/main" xmlns="" id="{EC471314-E46A-414B-8D91-74880E84F187}"/>
               </a:ext>
               <a:ext uri="{C183D7F6-B498-43B3-948B-1728B52AA6E4}">
-                <adec:decorative xmlns="" xmlns:adec="http://schemas.microsoft.com/office/drawing/2017/decorative" val="1"/>
+                <adec:decorative xmlns:adec="http://schemas.microsoft.com/office/drawing/2017/decorative" xmlns="" val="1"/>
               </a:ext>
             </a:extLst>
           </p:cNvPr>
@@ -27539,10 +27556,10 @@
           <p:cNvPr id="14" name="Freeform: Shape 13">
             <a:extLst>
               <a:ext uri="{FF2B5EF4-FFF2-40B4-BE49-F238E27FC236}">
-                <a16:creationId xmlns="" xmlns:a16="http://schemas.microsoft.com/office/drawing/2014/main" id="{6A681326-1C9D-44A3-A627-3871BDAE4127}"/>
+                <a16:creationId xmlns:a16="http://schemas.microsoft.com/office/drawing/2014/main" xmlns="" id="{6A681326-1C9D-44A3-A627-3871BDAE4127}"/>
               </a:ext>
               <a:ext uri="{C183D7F6-B498-43B3-948B-1728B52AA6E4}">
-                <adec:decorative xmlns="" xmlns:adec="http://schemas.microsoft.com/office/drawing/2017/decorative" val="1"/>
+                <adec:decorative xmlns:adec="http://schemas.microsoft.com/office/drawing/2017/decorative" xmlns="" val="1"/>
               </a:ext>
             </a:extLst>
           </p:cNvPr>
@@ -28002,7 +28019,7 @@
           <p:cNvPr id="2" name="Title 1">
             <a:extLst>
               <a:ext uri="{FF2B5EF4-FFF2-40B4-BE49-F238E27FC236}">
-                <a16:creationId xmlns="" xmlns:a16="http://schemas.microsoft.com/office/drawing/2014/main" id="{12E011C1-9465-414E-ADAE-ED2F0ABA662D}"/>
+                <a16:creationId xmlns:a16="http://schemas.microsoft.com/office/drawing/2014/main" xmlns="" id="{12E011C1-9465-414E-ADAE-ED2F0ABA662D}"/>
               </a:ext>
             </a:extLst>
           </p:cNvPr>
@@ -28041,7 +28058,7 @@
           <p:cNvPr id="3" name="Content Placeholder 2">
             <a:extLst>
               <a:ext uri="{FF2B5EF4-FFF2-40B4-BE49-F238E27FC236}">
-                <a16:creationId xmlns="" xmlns:a16="http://schemas.microsoft.com/office/drawing/2014/main" id="{07FDBAD7-EFC7-40EA-A7BA-03E336B3FE72}"/>
+                <a16:creationId xmlns:a16="http://schemas.microsoft.com/office/drawing/2014/main" xmlns="" id="{07FDBAD7-EFC7-40EA-A7BA-03E336B3FE72}"/>
               </a:ext>
             </a:extLst>
           </p:cNvPr>
@@ -28235,10 +28252,10 @@
           <p:cNvPr id="8" name="Rectangle 7">
             <a:extLst>
               <a:ext uri="{FF2B5EF4-FFF2-40B4-BE49-F238E27FC236}">
-                <a16:creationId xmlns="" xmlns:a16="http://schemas.microsoft.com/office/drawing/2014/main" id="{74CD14DB-BB81-479F-A1FC-1C75640E9F84}"/>
+                <a16:creationId xmlns:a16="http://schemas.microsoft.com/office/drawing/2014/main" xmlns="" id="{74CD14DB-BB81-479F-A1FC-1C75640E9F84}"/>
               </a:ext>
               <a:ext uri="{C183D7F6-B498-43B3-948B-1728B52AA6E4}">
-                <adec:decorative xmlns="" xmlns:adec="http://schemas.microsoft.com/office/drawing/2017/decorative" val="1"/>
+                <adec:decorative xmlns:adec="http://schemas.microsoft.com/office/drawing/2017/decorative" xmlns="" val="1"/>
               </a:ext>
             </a:extLst>
           </p:cNvPr>
@@ -28324,10 +28341,10 @@
           <p:cNvPr id="10" name="Rectangle 9">
             <a:extLst>
               <a:ext uri="{FF2B5EF4-FFF2-40B4-BE49-F238E27FC236}">
-                <a16:creationId xmlns="" xmlns:a16="http://schemas.microsoft.com/office/drawing/2014/main" id="{C943A91B-7CA7-4592-A975-73B1BF8C4C74}"/>
+                <a16:creationId xmlns:a16="http://schemas.microsoft.com/office/drawing/2014/main" xmlns="" id="{C943A91B-7CA7-4592-A975-73B1BF8C4C74}"/>
               </a:ext>
               <a:ext uri="{C183D7F6-B498-43B3-948B-1728B52AA6E4}">
-                <adec:decorative xmlns="" xmlns:adec="http://schemas.microsoft.com/office/drawing/2017/decorative" val="1"/>
+                <adec:decorative xmlns:adec="http://schemas.microsoft.com/office/drawing/2017/decorative" xmlns="" val="1"/>
               </a:ext>
             </a:extLst>
           </p:cNvPr>
@@ -28377,10 +28394,10 @@
           <p:cNvPr id="12" name="Freeform 7">
             <a:extLst>
               <a:ext uri="{FF2B5EF4-FFF2-40B4-BE49-F238E27FC236}">
-                <a16:creationId xmlns="" xmlns:a16="http://schemas.microsoft.com/office/drawing/2014/main" id="{EC471314-E46A-414B-8D91-74880E84F187}"/>
+                <a16:creationId xmlns:a16="http://schemas.microsoft.com/office/drawing/2014/main" xmlns="" id="{EC471314-E46A-414B-8D91-74880E84F187}"/>
               </a:ext>
               <a:ext uri="{C183D7F6-B498-43B3-948B-1728B52AA6E4}">
-                <adec:decorative xmlns="" xmlns:adec="http://schemas.microsoft.com/office/drawing/2017/decorative" val="1"/>
+                <adec:decorative xmlns:adec="http://schemas.microsoft.com/office/drawing/2017/decorative" xmlns="" val="1"/>
               </a:ext>
             </a:extLst>
           </p:cNvPr>
@@ -28766,10 +28783,10 @@
           <p:cNvPr id="14" name="Freeform: Shape 13">
             <a:extLst>
               <a:ext uri="{FF2B5EF4-FFF2-40B4-BE49-F238E27FC236}">
-                <a16:creationId xmlns="" xmlns:a16="http://schemas.microsoft.com/office/drawing/2014/main" id="{6A681326-1C9D-44A3-A627-3871BDAE4127}"/>
+                <a16:creationId xmlns:a16="http://schemas.microsoft.com/office/drawing/2014/main" xmlns="" id="{6A681326-1C9D-44A3-A627-3871BDAE4127}"/>
               </a:ext>
               <a:ext uri="{C183D7F6-B498-43B3-948B-1728B52AA6E4}">
-                <adec:decorative xmlns="" xmlns:adec="http://schemas.microsoft.com/office/drawing/2017/decorative" val="1"/>
+                <adec:decorative xmlns:adec="http://schemas.microsoft.com/office/drawing/2017/decorative" xmlns="" val="1"/>
               </a:ext>
             </a:extLst>
           </p:cNvPr>
@@ -29229,7 +29246,7 @@
           <p:cNvPr id="2" name="Title 1">
             <a:extLst>
               <a:ext uri="{FF2B5EF4-FFF2-40B4-BE49-F238E27FC236}">
-                <a16:creationId xmlns="" xmlns:a16="http://schemas.microsoft.com/office/drawing/2014/main" id="{12E011C1-9465-414E-ADAE-ED2F0ABA662D}"/>
+                <a16:creationId xmlns:a16="http://schemas.microsoft.com/office/drawing/2014/main" xmlns="" id="{12E011C1-9465-414E-ADAE-ED2F0ABA662D}"/>
               </a:ext>
             </a:extLst>
           </p:cNvPr>
@@ -29268,7 +29285,7 @@
           <p:cNvPr id="3" name="Content Placeholder 2">
             <a:extLst>
               <a:ext uri="{FF2B5EF4-FFF2-40B4-BE49-F238E27FC236}">
-                <a16:creationId xmlns="" xmlns:a16="http://schemas.microsoft.com/office/drawing/2014/main" id="{07FDBAD7-EFC7-40EA-A7BA-03E336B3FE72}"/>
+                <a16:creationId xmlns:a16="http://schemas.microsoft.com/office/drawing/2014/main" xmlns="" id="{07FDBAD7-EFC7-40EA-A7BA-03E336B3FE72}"/>
               </a:ext>
             </a:extLst>
           </p:cNvPr>
@@ -29408,10 +29425,10 @@
           <p:cNvPr id="8" name="Rectangle 7">
             <a:extLst>
               <a:ext uri="{FF2B5EF4-FFF2-40B4-BE49-F238E27FC236}">
-                <a16:creationId xmlns="" xmlns:a16="http://schemas.microsoft.com/office/drawing/2014/main" id="{74CD14DB-BB81-479F-A1FC-1C75640E9F84}"/>
+                <a16:creationId xmlns:a16="http://schemas.microsoft.com/office/drawing/2014/main" xmlns="" id="{74CD14DB-BB81-479F-A1FC-1C75640E9F84}"/>
               </a:ext>
               <a:ext uri="{C183D7F6-B498-43B3-948B-1728B52AA6E4}">
-                <adec:decorative xmlns="" xmlns:adec="http://schemas.microsoft.com/office/drawing/2017/decorative" val="1"/>
+                <adec:decorative xmlns:adec="http://schemas.microsoft.com/office/drawing/2017/decorative" xmlns="" val="1"/>
               </a:ext>
             </a:extLst>
           </p:cNvPr>
@@ -29497,10 +29514,10 @@
           <p:cNvPr id="10" name="Rectangle 9">
             <a:extLst>
               <a:ext uri="{FF2B5EF4-FFF2-40B4-BE49-F238E27FC236}">
-                <a16:creationId xmlns="" xmlns:a16="http://schemas.microsoft.com/office/drawing/2014/main" id="{C943A91B-7CA7-4592-A975-73B1BF8C4C74}"/>
+                <a16:creationId xmlns:a16="http://schemas.microsoft.com/office/drawing/2014/main" xmlns="" id="{C943A91B-7CA7-4592-A975-73B1BF8C4C74}"/>
               </a:ext>
               <a:ext uri="{C183D7F6-B498-43B3-948B-1728B52AA6E4}">
-                <adec:decorative xmlns="" xmlns:adec="http://schemas.microsoft.com/office/drawing/2017/decorative" val="1"/>
+                <adec:decorative xmlns:adec="http://schemas.microsoft.com/office/drawing/2017/decorative" xmlns="" val="1"/>
               </a:ext>
             </a:extLst>
           </p:cNvPr>
@@ -29550,10 +29567,10 @@
           <p:cNvPr id="12" name="Freeform 7">
             <a:extLst>
               <a:ext uri="{FF2B5EF4-FFF2-40B4-BE49-F238E27FC236}">
-                <a16:creationId xmlns="" xmlns:a16="http://schemas.microsoft.com/office/drawing/2014/main" id="{EC471314-E46A-414B-8D91-74880E84F187}"/>
+                <a16:creationId xmlns:a16="http://schemas.microsoft.com/office/drawing/2014/main" xmlns="" id="{EC471314-E46A-414B-8D91-74880E84F187}"/>
               </a:ext>
               <a:ext uri="{C183D7F6-B498-43B3-948B-1728B52AA6E4}">
-                <adec:decorative xmlns="" xmlns:adec="http://schemas.microsoft.com/office/drawing/2017/decorative" val="1"/>
+                <adec:decorative xmlns:adec="http://schemas.microsoft.com/office/drawing/2017/decorative" xmlns="" val="1"/>
               </a:ext>
             </a:extLst>
           </p:cNvPr>
@@ -29939,10 +29956,10 @@
           <p:cNvPr id="14" name="Freeform: Shape 13">
             <a:extLst>
               <a:ext uri="{FF2B5EF4-FFF2-40B4-BE49-F238E27FC236}">
-                <a16:creationId xmlns="" xmlns:a16="http://schemas.microsoft.com/office/drawing/2014/main" id="{6A681326-1C9D-44A3-A627-3871BDAE4127}"/>
+                <a16:creationId xmlns:a16="http://schemas.microsoft.com/office/drawing/2014/main" xmlns="" id="{6A681326-1C9D-44A3-A627-3871BDAE4127}"/>
               </a:ext>
               <a:ext uri="{C183D7F6-B498-43B3-948B-1728B52AA6E4}">
-                <adec:decorative xmlns="" xmlns:adec="http://schemas.microsoft.com/office/drawing/2017/decorative" val="1"/>
+                <adec:decorative xmlns:adec="http://schemas.microsoft.com/office/drawing/2017/decorative" xmlns="" val="1"/>
               </a:ext>
             </a:extLst>
           </p:cNvPr>
@@ -30402,7 +30419,7 @@
           <p:cNvPr id="2" name="Title 1">
             <a:extLst>
               <a:ext uri="{FF2B5EF4-FFF2-40B4-BE49-F238E27FC236}">
-                <a16:creationId xmlns="" xmlns:a16="http://schemas.microsoft.com/office/drawing/2014/main" id="{B7071FE9-1E09-4CD9-87A5-923A30F20AA2}"/>
+                <a16:creationId xmlns:a16="http://schemas.microsoft.com/office/drawing/2014/main" xmlns="" id="{B7071FE9-1E09-4CD9-87A5-923A30F20AA2}"/>
               </a:ext>
             </a:extLst>
           </p:cNvPr>
@@ -30441,7 +30458,7 @@
           <p:cNvPr id="3" name="Content Placeholder 2">
             <a:extLst>
               <a:ext uri="{FF2B5EF4-FFF2-40B4-BE49-F238E27FC236}">
-                <a16:creationId xmlns="" xmlns:a16="http://schemas.microsoft.com/office/drawing/2014/main" id="{5042D8AC-A055-42E8-AF39-7C9B30ED64D9}"/>
+                <a16:creationId xmlns:a16="http://schemas.microsoft.com/office/drawing/2014/main" xmlns="" id="{5042D8AC-A055-42E8-AF39-7C9B30ED64D9}"/>
               </a:ext>
             </a:extLst>
           </p:cNvPr>
@@ -30602,10 +30619,10 @@
           <p:cNvPr id="8" name="Rectangle 7">
             <a:extLst>
               <a:ext uri="{FF2B5EF4-FFF2-40B4-BE49-F238E27FC236}">
-                <a16:creationId xmlns="" xmlns:a16="http://schemas.microsoft.com/office/drawing/2014/main" id="{74CD14DB-BB81-479F-A1FC-1C75640E9F84}"/>
+                <a16:creationId xmlns:a16="http://schemas.microsoft.com/office/drawing/2014/main" xmlns="" id="{74CD14DB-BB81-479F-A1FC-1C75640E9F84}"/>
               </a:ext>
               <a:ext uri="{C183D7F6-B498-43B3-948B-1728B52AA6E4}">
-                <adec:decorative xmlns="" xmlns:adec="http://schemas.microsoft.com/office/drawing/2017/decorative" val="1"/>
+                <adec:decorative xmlns:adec="http://schemas.microsoft.com/office/drawing/2017/decorative" xmlns="" val="1"/>
               </a:ext>
             </a:extLst>
           </p:cNvPr>
@@ -30691,10 +30708,10 @@
           <p:cNvPr id="10" name="Rectangle 9">
             <a:extLst>
               <a:ext uri="{FF2B5EF4-FFF2-40B4-BE49-F238E27FC236}">
-                <a16:creationId xmlns="" xmlns:a16="http://schemas.microsoft.com/office/drawing/2014/main" id="{C943A91B-7CA7-4592-A975-73B1BF8C4C74}"/>
+                <a16:creationId xmlns:a16="http://schemas.microsoft.com/office/drawing/2014/main" xmlns="" id="{C943A91B-7CA7-4592-A975-73B1BF8C4C74}"/>
               </a:ext>
               <a:ext uri="{C183D7F6-B498-43B3-948B-1728B52AA6E4}">
-                <adec:decorative xmlns="" xmlns:adec="http://schemas.microsoft.com/office/drawing/2017/decorative" val="1"/>
+                <adec:decorative xmlns:adec="http://schemas.microsoft.com/office/drawing/2017/decorative" xmlns="" val="1"/>
               </a:ext>
             </a:extLst>
           </p:cNvPr>
@@ -30744,10 +30761,10 @@
           <p:cNvPr id="12" name="Freeform 7">
             <a:extLst>
               <a:ext uri="{FF2B5EF4-FFF2-40B4-BE49-F238E27FC236}">
-                <a16:creationId xmlns="" xmlns:a16="http://schemas.microsoft.com/office/drawing/2014/main" id="{EC471314-E46A-414B-8D91-74880E84F187}"/>
+                <a16:creationId xmlns:a16="http://schemas.microsoft.com/office/drawing/2014/main" xmlns="" id="{EC471314-E46A-414B-8D91-74880E84F187}"/>
               </a:ext>
               <a:ext uri="{C183D7F6-B498-43B3-948B-1728B52AA6E4}">
-                <adec:decorative xmlns="" xmlns:adec="http://schemas.microsoft.com/office/drawing/2017/decorative" val="1"/>
+                <adec:decorative xmlns:adec="http://schemas.microsoft.com/office/drawing/2017/decorative" xmlns="" val="1"/>
               </a:ext>
             </a:extLst>
           </p:cNvPr>
@@ -31133,10 +31150,10 @@
           <p:cNvPr id="14" name="Freeform: Shape 13">
             <a:extLst>
               <a:ext uri="{FF2B5EF4-FFF2-40B4-BE49-F238E27FC236}">
-                <a16:creationId xmlns="" xmlns:a16="http://schemas.microsoft.com/office/drawing/2014/main" id="{6A681326-1C9D-44A3-A627-3871BDAE4127}"/>
+                <a16:creationId xmlns:a16="http://schemas.microsoft.com/office/drawing/2014/main" xmlns="" id="{6A681326-1C9D-44A3-A627-3871BDAE4127}"/>
               </a:ext>
               <a:ext uri="{C183D7F6-B498-43B3-948B-1728B52AA6E4}">
-                <adec:decorative xmlns="" xmlns:adec="http://schemas.microsoft.com/office/drawing/2017/decorative" val="1"/>
+                <adec:decorative xmlns:adec="http://schemas.microsoft.com/office/drawing/2017/decorative" xmlns="" val="1"/>
               </a:ext>
             </a:extLst>
           </p:cNvPr>
@@ -31596,7 +31613,7 @@
           <p:cNvPr id="2" name="Title 1">
             <a:extLst>
               <a:ext uri="{FF2B5EF4-FFF2-40B4-BE49-F238E27FC236}">
-                <a16:creationId xmlns="" xmlns:a16="http://schemas.microsoft.com/office/drawing/2014/main" id="{B7071FE9-1E09-4CD9-87A5-923A30F20AA2}"/>
+                <a16:creationId xmlns:a16="http://schemas.microsoft.com/office/drawing/2014/main" xmlns="" id="{B7071FE9-1E09-4CD9-87A5-923A30F20AA2}"/>
               </a:ext>
             </a:extLst>
           </p:cNvPr>
@@ -31635,7 +31652,7 @@
           <p:cNvPr id="3" name="Content Placeholder 2">
             <a:extLst>
               <a:ext uri="{FF2B5EF4-FFF2-40B4-BE49-F238E27FC236}">
-                <a16:creationId xmlns="" xmlns:a16="http://schemas.microsoft.com/office/drawing/2014/main" id="{5042D8AC-A055-42E8-AF39-7C9B30ED64D9}"/>
+                <a16:creationId xmlns:a16="http://schemas.microsoft.com/office/drawing/2014/main" xmlns="" id="{5042D8AC-A055-42E8-AF39-7C9B30ED64D9}"/>
               </a:ext>
             </a:extLst>
           </p:cNvPr>

</xml_diff>